<commit_message>
adding codebuild project to download latest cfct template
</commit_message>
<xml_diff>
--- a/aws_sra_examples/solutions/common/common_cfct_setup/documentation/common-cfct-setup.pptx
+++ b/aws_sra_examples/solutions/common/common_cfct_setup/documentation/common-cfct-setup.pptx
@@ -8,7 +8,7 @@
     <p:notesMasterId r:id="rId3"/>
   </p:notesMasterIdLst>
   <p:sldIdLst>
-    <p:sldId id="257" r:id="rId2"/>
+    <p:sldId id="260" r:id="rId2"/>
   </p:sldIdLst>
   <p:sldSz cx="12192000" cy="6858000"/>
   <p:notesSz cx="6858000" cy="9144000"/>
@@ -109,7 +109,18 @@
   </p:defaultTextStyle>
   <p:extLst>
     <p:ext uri="{EFAFB233-063F-42B5-8137-9DF3F51BA10A}">
-      <p15:sldGuideLst xmlns:p15="http://schemas.microsoft.com/office/powerpoint/2012/main"/>
+      <p15:sldGuideLst xmlns:p15="http://schemas.microsoft.com/office/powerpoint/2012/main">
+        <p15:guide id="1" pos="3840" userDrawn="1">
+          <p15:clr>
+            <a:srgbClr val="A4A3A4"/>
+          </p15:clr>
+        </p15:guide>
+        <p15:guide id="2" orient="horz" pos="2160" userDrawn="1">
+          <p15:clr>
+            <a:srgbClr val="A4A3A4"/>
+          </p15:clr>
+        </p15:guide>
+      </p15:sldGuideLst>
     </p:ext>
   </p:extLst>
 </p:presentation>
@@ -197,7 +208,7 @@
           <a:p>
             <a:fld id="{FD8D84E3-00BA-4A46-8256-7E527D8B4480}" type="datetimeFigureOut">
               <a:rPr lang="en-US" smtClean="0"/>
-              <a:t>3/6/22</a:t>
+              <a:t>11/21/23</a:t>
             </a:fld>
             <a:endParaRPr lang="en-US"/>
           </a:p>
@@ -538,7 +549,7 @@
     </p:spTree>
     <p:extLst>
       <p:ext uri="{BB962C8B-B14F-4D97-AF65-F5344CB8AC3E}">
-        <p14:creationId xmlns:p14="http://schemas.microsoft.com/office/powerpoint/2010/main" val="304048535"/>
+        <p14:creationId xmlns:p14="http://schemas.microsoft.com/office/powerpoint/2010/main" val="2701646952"/>
       </p:ext>
     </p:extLst>
   </p:cSld>
@@ -695,7 +706,7 @@
           <a:p>
             <a:fld id="{9FE185F7-9B28-9F45-9F43-9CB5A0B99390}" type="datetimeFigureOut">
               <a:rPr lang="en-US" smtClean="0"/>
-              <a:t>3/6/22</a:t>
+              <a:t>11/21/23</a:t>
             </a:fld>
             <a:endParaRPr lang="en-US"/>
           </a:p>
@@ -893,7 +904,7 @@
           <a:p>
             <a:fld id="{9FE185F7-9B28-9F45-9F43-9CB5A0B99390}" type="datetimeFigureOut">
               <a:rPr lang="en-US" smtClean="0"/>
-              <a:t>3/6/22</a:t>
+              <a:t>11/21/23</a:t>
             </a:fld>
             <a:endParaRPr lang="en-US"/>
           </a:p>
@@ -1101,7 +1112,7 @@
           <a:p>
             <a:fld id="{9FE185F7-9B28-9F45-9F43-9CB5A0B99390}" type="datetimeFigureOut">
               <a:rPr lang="en-US" smtClean="0"/>
-              <a:t>3/6/22</a:t>
+              <a:t>11/21/23</a:t>
             </a:fld>
             <a:endParaRPr lang="en-US"/>
           </a:p>
@@ -1299,7 +1310,7 @@
           <a:p>
             <a:fld id="{9FE185F7-9B28-9F45-9F43-9CB5A0B99390}" type="datetimeFigureOut">
               <a:rPr lang="en-US" smtClean="0"/>
-              <a:t>3/6/22</a:t>
+              <a:t>11/21/23</a:t>
             </a:fld>
             <a:endParaRPr lang="en-US"/>
           </a:p>
@@ -1574,7 +1585,7 @@
           <a:p>
             <a:fld id="{9FE185F7-9B28-9F45-9F43-9CB5A0B99390}" type="datetimeFigureOut">
               <a:rPr lang="en-US" smtClean="0"/>
-              <a:t>3/6/22</a:t>
+              <a:t>11/21/23</a:t>
             </a:fld>
             <a:endParaRPr lang="en-US"/>
           </a:p>
@@ -1839,7 +1850,7 @@
           <a:p>
             <a:fld id="{9FE185F7-9B28-9F45-9F43-9CB5A0B99390}" type="datetimeFigureOut">
               <a:rPr lang="en-US" smtClean="0"/>
-              <a:t>3/6/22</a:t>
+              <a:t>11/21/23</a:t>
             </a:fld>
             <a:endParaRPr lang="en-US"/>
           </a:p>
@@ -2251,7 +2262,7 @@
           <a:p>
             <a:fld id="{9FE185F7-9B28-9F45-9F43-9CB5A0B99390}" type="datetimeFigureOut">
               <a:rPr lang="en-US" smtClean="0"/>
-              <a:t>3/6/22</a:t>
+              <a:t>11/21/23</a:t>
             </a:fld>
             <a:endParaRPr lang="en-US"/>
           </a:p>
@@ -2392,7 +2403,7 @@
           <a:p>
             <a:fld id="{9FE185F7-9B28-9F45-9F43-9CB5A0B99390}" type="datetimeFigureOut">
               <a:rPr lang="en-US" smtClean="0"/>
-              <a:t>3/6/22</a:t>
+              <a:t>11/21/23</a:t>
             </a:fld>
             <a:endParaRPr lang="en-US"/>
           </a:p>
@@ -2505,7 +2516,7 @@
           <a:p>
             <a:fld id="{9FE185F7-9B28-9F45-9F43-9CB5A0B99390}" type="datetimeFigureOut">
               <a:rPr lang="en-US" smtClean="0"/>
-              <a:t>3/6/22</a:t>
+              <a:t>11/21/23</a:t>
             </a:fld>
             <a:endParaRPr lang="en-US"/>
           </a:p>
@@ -2816,7 +2827,7 @@
           <a:p>
             <a:fld id="{9FE185F7-9B28-9F45-9F43-9CB5A0B99390}" type="datetimeFigureOut">
               <a:rPr lang="en-US" smtClean="0"/>
-              <a:t>3/6/22</a:t>
+              <a:t>11/21/23</a:t>
             </a:fld>
             <a:endParaRPr lang="en-US"/>
           </a:p>
@@ -3104,7 +3115,7 @@
           <a:p>
             <a:fld id="{9FE185F7-9B28-9F45-9F43-9CB5A0B99390}" type="datetimeFigureOut">
               <a:rPr lang="en-US" smtClean="0"/>
-              <a:t>3/6/22</a:t>
+              <a:t>11/21/23</a:t>
             </a:fld>
             <a:endParaRPr lang="en-US"/>
           </a:p>
@@ -3345,7 +3356,7 @@
           <a:p>
             <a:fld id="{9FE185F7-9B28-9F45-9F43-9CB5A0B99390}" type="datetimeFigureOut">
               <a:rPr lang="en-US" smtClean="0"/>
-              <a:t>3/6/22</a:t>
+              <a:t>11/21/23</a:t>
             </a:fld>
             <a:endParaRPr lang="en-US"/>
           </a:p>
@@ -3764,10 +3775,10 @@
       </p:grpSpPr>
       <p:sp>
         <p:nvSpPr>
-          <p:cNvPr id="27" name="Rectangle 26">
-            <a:extLst>
-              <a:ext uri="{FF2B5EF4-FFF2-40B4-BE49-F238E27FC236}">
-                <a16:creationId xmlns:a16="http://schemas.microsoft.com/office/drawing/2014/main" id="{0D1E596F-94A8-4843-9078-9508FDE2D2FD}"/>
+          <p:cNvPr id="81" name="Rectangle 80">
+            <a:extLst>
+              <a:ext uri="{FF2B5EF4-FFF2-40B4-BE49-F238E27FC236}">
+                <a16:creationId xmlns:a16="http://schemas.microsoft.com/office/drawing/2014/main" id="{FD0BEA75-341F-49B4-83DB-758CA12480EF}"/>
               </a:ext>
             </a:extLst>
           </p:cNvPr>
@@ -3776,15 +3787,13 @@
         </p:nvSpPr>
         <p:spPr>
           <a:xfrm>
-            <a:off x="4258722" y="1597382"/>
-            <a:ext cx="4058428" cy="3052439"/>
+            <a:off x="503605" y="158632"/>
+            <a:ext cx="10985663" cy="6540737"/>
           </a:xfrm>
           <a:prstGeom prst="rect">
             <a:avLst/>
           </a:prstGeom>
-          <a:solidFill>
-            <a:schemeClr val="bg1"/>
-          </a:solidFill>
+          <a:noFill/>
           <a:ln w="12700">
             <a:solidFill>
               <a:schemeClr val="tx1"/>
@@ -3808,108 +3817,20 @@
           </a:fontRef>
         </p:style>
         <p:txBody>
-          <a:bodyPr rot="0" spcFirstLastPara="0" vert="horz" wrap="square" lIns="457200" tIns="91440" rIns="91440" bIns="45720" numCol="1" spcCol="0" rtlCol="0" fromWordArt="0" anchor="t" anchorCtr="0" forceAA="0" compatLnSpc="1">
-            <a:prstTxWarp prst="textNoShape">
-              <a:avLst/>
-            </a:prstTxWarp>
-            <a:noAutofit/>
-          </a:bodyPr>
-          <a:lstStyle>
-            <a:lvl1pPr>
-              <a:defRPr>
-                <a:solidFill>
-                  <a:schemeClr val="lt1"/>
-                </a:solidFill>
-                <a:latin typeface="+mn-lt"/>
-                <a:ea typeface="+mn-ea"/>
-                <a:cs typeface="+mn-cs"/>
-              </a:defRPr>
-            </a:lvl1pPr>
-            <a:lvl2pPr>
-              <a:defRPr>
-                <a:solidFill>
-                  <a:schemeClr val="lt1"/>
-                </a:solidFill>
-                <a:latin typeface="+mn-lt"/>
-                <a:ea typeface="+mn-ea"/>
-                <a:cs typeface="+mn-cs"/>
-              </a:defRPr>
-            </a:lvl2pPr>
-            <a:lvl3pPr>
-              <a:defRPr>
-                <a:solidFill>
-                  <a:schemeClr val="lt1"/>
-                </a:solidFill>
-                <a:latin typeface="+mn-lt"/>
-                <a:ea typeface="+mn-ea"/>
-                <a:cs typeface="+mn-cs"/>
-              </a:defRPr>
-            </a:lvl3pPr>
-            <a:lvl4pPr>
-              <a:defRPr>
-                <a:solidFill>
-                  <a:schemeClr val="lt1"/>
-                </a:solidFill>
-                <a:latin typeface="+mn-lt"/>
-                <a:ea typeface="+mn-ea"/>
-                <a:cs typeface="+mn-cs"/>
-              </a:defRPr>
-            </a:lvl4pPr>
-            <a:lvl5pPr>
-              <a:defRPr>
-                <a:solidFill>
-                  <a:schemeClr val="lt1"/>
-                </a:solidFill>
-                <a:latin typeface="+mn-lt"/>
-                <a:ea typeface="+mn-ea"/>
-                <a:cs typeface="+mn-cs"/>
-              </a:defRPr>
-            </a:lvl5pPr>
-            <a:lvl6pPr>
-              <a:defRPr>
-                <a:solidFill>
-                  <a:schemeClr val="lt1"/>
-                </a:solidFill>
-                <a:latin typeface="+mn-lt"/>
-                <a:ea typeface="+mn-ea"/>
-                <a:cs typeface="+mn-cs"/>
-              </a:defRPr>
-            </a:lvl6pPr>
-            <a:lvl7pPr>
-              <a:defRPr>
-                <a:solidFill>
-                  <a:schemeClr val="lt1"/>
-                </a:solidFill>
-                <a:latin typeface="+mn-lt"/>
-                <a:ea typeface="+mn-ea"/>
-                <a:cs typeface="+mn-cs"/>
-              </a:defRPr>
-            </a:lvl7pPr>
-            <a:lvl8pPr>
-              <a:defRPr>
-                <a:solidFill>
-                  <a:schemeClr val="lt1"/>
-                </a:solidFill>
-                <a:latin typeface="+mn-lt"/>
-                <a:ea typeface="+mn-ea"/>
-                <a:cs typeface="+mn-cs"/>
-              </a:defRPr>
-            </a:lvl8pPr>
-            <a:lvl9pPr>
-              <a:defRPr>
-                <a:solidFill>
-                  <a:schemeClr val="lt1"/>
-                </a:solidFill>
-                <a:latin typeface="+mn-lt"/>
-                <a:ea typeface="+mn-ea"/>
-                <a:cs typeface="+mn-cs"/>
-              </a:defRPr>
-            </a:lvl9pPr>
-          </a:lstStyle>
-          <a:p>
-            <a:pPr algn="l"/>
-            <a:r>
-              <a:rPr lang="en-US" sz="1400" dirty="0">
+          <a:bodyPr lIns="502920" tIns="91440"/>
+          <a:lstStyle/>
+          <a:p>
+            <a:pPr eaLnBrk="1" fontAlgn="auto" hangingPunct="1">
+              <a:spcBef>
+                <a:spcPts val="0"/>
+              </a:spcBef>
+              <a:spcAft>
+                <a:spcPts val="0"/>
+              </a:spcAft>
+              <a:defRPr/>
+            </a:pPr>
+            <a:r>
+              <a:rPr lang="en-US" sz="1200" dirty="0">
                 <a:solidFill>
                   <a:sysClr val="windowText" lastClr="000000"/>
                 </a:solidFill>
@@ -3923,10 +3844,10 @@
       </p:sp>
       <p:pic>
         <p:nvPicPr>
-          <p:cNvPr id="126" name="Graphic 2">
-            <a:extLst>
-              <a:ext uri="{FF2B5EF4-FFF2-40B4-BE49-F238E27FC236}">
-                <a16:creationId xmlns:a16="http://schemas.microsoft.com/office/drawing/2014/main" id="{F04267D0-7955-2C4A-842B-D8A3A9599CC0}"/>
+          <p:cNvPr id="82" name="Graphic 81">
+            <a:extLst>
+              <a:ext uri="{FF2B5EF4-FFF2-40B4-BE49-F238E27FC236}">
+                <a16:creationId xmlns:a16="http://schemas.microsoft.com/office/drawing/2014/main" id="{ADF00096-D97F-4D69-B4CB-8B0D7A8DF2BF}"/>
               </a:ext>
             </a:extLst>
           </p:cNvPr>
@@ -3943,14 +3864,13 @@
               </a:ext>
             </a:extLst>
           </a:blip>
-          <a:stretch>
-            <a:fillRect/>
-          </a:stretch>
+          <a:srcRect/>
+          <a:stretch/>
         </p:blipFill>
         <p:spPr>
           <a:xfrm>
-            <a:off x="4258722" y="1597382"/>
-            <a:ext cx="330200" cy="330200"/>
+            <a:off x="503605" y="158631"/>
+            <a:ext cx="381000" cy="381000"/>
           </a:xfrm>
           <a:prstGeom prst="rect">
             <a:avLst/>
@@ -3959,10 +3879,10 @@
       </p:pic>
       <p:sp>
         <p:nvSpPr>
-          <p:cNvPr id="129" name="Rectangle 128">
-            <a:extLst>
-              <a:ext uri="{FF2B5EF4-FFF2-40B4-BE49-F238E27FC236}">
-                <a16:creationId xmlns:a16="http://schemas.microsoft.com/office/drawing/2014/main" id="{FB73AA4D-BE37-B546-8168-72555838077A}"/>
+          <p:cNvPr id="87" name="Rectangle 86">
+            <a:extLst>
+              <a:ext uri="{FF2B5EF4-FFF2-40B4-BE49-F238E27FC236}">
+                <a16:creationId xmlns:a16="http://schemas.microsoft.com/office/drawing/2014/main" id="{233194F9-79FD-453D-AC8F-FA9F8DEF9795}"/>
               </a:ext>
             </a:extLst>
           </p:cNvPr>
@@ -3971,8 +3891,8 @@
         </p:nvSpPr>
         <p:spPr>
           <a:xfrm>
-            <a:off x="4388803" y="2009655"/>
-            <a:ext cx="3811615" cy="2503979"/>
+            <a:off x="667130" y="590707"/>
+            <a:ext cx="10492127" cy="5886293"/>
           </a:xfrm>
           <a:prstGeom prst="rect">
             <a:avLst/>
@@ -3980,9 +3900,8 @@
           <a:noFill/>
           <a:ln w="12700">
             <a:solidFill>
-              <a:schemeClr val="tx1"/>
+              <a:srgbClr val="CD2264"/>
             </a:solidFill>
-            <a:prstDash val="solid"/>
           </a:ln>
         </p:spPr>
         <p:style>
@@ -4002,73 +3921,37 @@
           </a:fontRef>
         </p:style>
         <p:txBody>
-          <a:bodyPr rot="0" spcFirstLastPara="0" vertOverflow="overflow" horzOverflow="overflow" vert="horz" wrap="square" lIns="91440" tIns="91440" rIns="91440" bIns="45720" numCol="1" spcCol="0" rtlCol="0" fromWordArt="0" anchor="t" anchorCtr="0" forceAA="0" compatLnSpc="1">
-            <a:prstTxWarp prst="textNoShape">
-              <a:avLst/>
-            </a:prstTxWarp>
-            <a:noAutofit/>
-          </a:bodyPr>
-          <a:lstStyle/>
-          <a:p>
-            <a:pPr algn="ctr"/>
-            <a:r>
-              <a:rPr lang="en-US" sz="1400" dirty="0">
+          <a:bodyPr lIns="502920" tIns="91440"/>
+          <a:lstStyle/>
+          <a:p>
+            <a:pPr eaLnBrk="1" fontAlgn="auto" hangingPunct="1">
+              <a:spcBef>
+                <a:spcPts val="0"/>
+              </a:spcBef>
+              <a:spcAft>
+                <a:spcPts val="0"/>
+              </a:spcAft>
+              <a:defRPr/>
+            </a:pPr>
+            <a:r>
+              <a:rPr lang="en-US" sz="1200" dirty="0">
                 <a:solidFill>
-                  <a:schemeClr val="tx1"/>
+                  <a:srgbClr val="CD2264"/>
                 </a:solidFill>
                 <a:latin typeface="Arial" panose="020B0604020202020204" pitchFamily="34" charset="0"/>
                 <a:cs typeface="Arial" panose="020B0604020202020204" pitchFamily="34" charset="0"/>
               </a:rPr>
-              <a:t>Organization Management Account</a:t>
-            </a:r>
-          </a:p>
-        </p:txBody>
-      </p:sp>
-      <p:sp>
-        <p:nvSpPr>
-          <p:cNvPr id="151" name="TextBox 150">
-            <a:extLst>
-              <a:ext uri="{FF2B5EF4-FFF2-40B4-BE49-F238E27FC236}">
-                <a16:creationId xmlns:a16="http://schemas.microsoft.com/office/drawing/2014/main" id="{08B67E83-7D09-C748-AEEF-49786315014A}"/>
-              </a:ext>
-            </a:extLst>
-          </p:cNvPr>
-          <p:cNvSpPr txBox="1"/>
-          <p:nvPr/>
-        </p:nvSpPr>
-        <p:spPr>
-          <a:xfrm>
-            <a:off x="4767497" y="3530414"/>
-            <a:ext cx="1307240" cy="430887"/>
-          </a:xfrm>
-          <a:prstGeom prst="rect">
-            <a:avLst/>
-          </a:prstGeom>
-          <a:noFill/>
-        </p:spPr>
-        <p:txBody>
-          <a:bodyPr wrap="square" rtlCol="0">
-            <a:spAutoFit/>
-          </a:bodyPr>
-          <a:lstStyle/>
-          <a:p>
-            <a:pPr algn="ctr"/>
-            <a:r>
-              <a:rPr lang="en-US" sz="1100" dirty="0">
-                <a:latin typeface="Arial" panose="020B0604020202020204" pitchFamily="34" charset="0"/>
-                <a:cs typeface="Arial" panose="020B0604020202020204" pitchFamily="34" charset="0"/>
-              </a:rPr>
-              <a:t>AWS CloudFormation</a:t>
+              <a:t>     Organization Management Account</a:t>
             </a:r>
           </a:p>
         </p:txBody>
       </p:sp>
       <p:pic>
         <p:nvPicPr>
-          <p:cNvPr id="152" name="Graphic 151">
-            <a:extLst>
-              <a:ext uri="{FF2B5EF4-FFF2-40B4-BE49-F238E27FC236}">
-                <a16:creationId xmlns:a16="http://schemas.microsoft.com/office/drawing/2014/main" id="{399FFB55-9DC7-0642-93ED-51225281247C}"/>
+          <p:cNvPr id="88" name="Graphic 87">
+            <a:extLst>
+              <a:ext uri="{FF2B5EF4-FFF2-40B4-BE49-F238E27FC236}">
+                <a16:creationId xmlns:a16="http://schemas.microsoft.com/office/drawing/2014/main" id="{234AB67D-9201-40E8-83E1-AF224AFD12B8}"/>
               </a:ext>
             </a:extLst>
           </p:cNvPr>
@@ -4091,8 +3974,8 @@
         </p:blipFill>
         <p:spPr>
           <a:xfrm>
-            <a:off x="5192517" y="3073214"/>
-            <a:ext cx="457200" cy="457200"/>
+            <a:off x="664112" y="590706"/>
+            <a:ext cx="537059" cy="537059"/>
           </a:xfrm>
           <a:prstGeom prst="rect">
             <a:avLst/>
@@ -4101,10 +3984,459 @@
       </p:pic>
       <p:sp>
         <p:nvSpPr>
-          <p:cNvPr id="226" name="Oval 225">
-            <a:extLst>
-              <a:ext uri="{FF2B5EF4-FFF2-40B4-BE49-F238E27FC236}">
-                <a16:creationId xmlns:a16="http://schemas.microsoft.com/office/drawing/2014/main" id="{B075B0CF-8F6A-3947-BD02-50EB6DA85CEE}"/>
+          <p:cNvPr id="122" name="TextBox 2">
+            <a:extLst>
+              <a:ext uri="{FF2B5EF4-FFF2-40B4-BE49-F238E27FC236}">
+                <a16:creationId xmlns:a16="http://schemas.microsoft.com/office/drawing/2014/main" id="{D779FD12-DEC5-45B4-89B4-2B5EBBA6290B}"/>
+              </a:ext>
+            </a:extLst>
+          </p:cNvPr>
+          <p:cNvSpPr txBox="1"/>
+          <p:nvPr/>
+        </p:nvSpPr>
+        <p:spPr>
+          <a:xfrm>
+            <a:off x="5716417" y="2910666"/>
+            <a:ext cx="1454645" cy="276999"/>
+          </a:xfrm>
+          <a:prstGeom prst="rect">
+            <a:avLst/>
+          </a:prstGeom>
+          <a:noFill/>
+        </p:spPr>
+        <p:style>
+          <a:lnRef idx="0">
+            <a:scrgbClr r="0" g="0" b="0"/>
+          </a:lnRef>
+          <a:fillRef idx="0">
+            <a:scrgbClr r="0" g="0" b="0"/>
+          </a:fillRef>
+          <a:effectRef idx="0">
+            <a:scrgbClr r="0" g="0" b="0"/>
+          </a:effectRef>
+          <a:fontRef idx="major"/>
+        </p:style>
+        <p:txBody>
+          <a:bodyPr wrap="square" rtlCol="0">
+            <a:spAutoFit/>
+          </a:bodyPr>
+          <a:lstStyle>
+            <a:lvl1pPr>
+              <a:defRPr>
+                <a:latin typeface="+mj-lt"/>
+                <a:ea typeface="+mj-ea"/>
+                <a:cs typeface="+mj-cs"/>
+              </a:defRPr>
+            </a:lvl1pPr>
+            <a:lvl2pPr>
+              <a:defRPr>
+                <a:latin typeface="+mj-lt"/>
+                <a:ea typeface="+mj-ea"/>
+                <a:cs typeface="+mj-cs"/>
+              </a:defRPr>
+            </a:lvl2pPr>
+            <a:lvl3pPr>
+              <a:defRPr>
+                <a:latin typeface="+mj-lt"/>
+                <a:ea typeface="+mj-ea"/>
+                <a:cs typeface="+mj-cs"/>
+              </a:defRPr>
+            </a:lvl3pPr>
+            <a:lvl4pPr>
+              <a:defRPr>
+                <a:latin typeface="+mj-lt"/>
+                <a:ea typeface="+mj-ea"/>
+                <a:cs typeface="+mj-cs"/>
+              </a:defRPr>
+            </a:lvl4pPr>
+            <a:lvl5pPr>
+              <a:defRPr>
+                <a:latin typeface="+mj-lt"/>
+                <a:ea typeface="+mj-ea"/>
+                <a:cs typeface="+mj-cs"/>
+              </a:defRPr>
+            </a:lvl5pPr>
+            <a:lvl6pPr>
+              <a:defRPr>
+                <a:latin typeface="+mj-lt"/>
+                <a:ea typeface="+mj-ea"/>
+                <a:cs typeface="+mj-cs"/>
+              </a:defRPr>
+            </a:lvl6pPr>
+            <a:lvl7pPr>
+              <a:defRPr>
+                <a:latin typeface="+mj-lt"/>
+                <a:ea typeface="+mj-ea"/>
+                <a:cs typeface="+mj-cs"/>
+              </a:defRPr>
+            </a:lvl7pPr>
+            <a:lvl8pPr>
+              <a:defRPr>
+                <a:latin typeface="+mj-lt"/>
+                <a:ea typeface="+mj-ea"/>
+                <a:cs typeface="+mj-cs"/>
+              </a:defRPr>
+            </a:lvl8pPr>
+            <a:lvl9pPr>
+              <a:defRPr>
+                <a:latin typeface="+mj-lt"/>
+                <a:ea typeface="+mj-ea"/>
+                <a:cs typeface="+mj-cs"/>
+              </a:defRPr>
+            </a:lvl9pPr>
+          </a:lstStyle>
+          <a:p>
+            <a:pPr algn="ctr"/>
+            <a:r>
+              <a:rPr lang="en-US" sz="1200" dirty="0">
+                <a:latin typeface="Arial" panose="020B0604020202020204" pitchFamily="34" charset="0"/>
+                <a:cs typeface="Arial" panose="020B0604020202020204" pitchFamily="34" charset="0"/>
+              </a:rPr>
+              <a:t>Lambda Function</a:t>
+            </a:r>
+          </a:p>
+        </p:txBody>
+      </p:sp>
+      <p:sp>
+        <p:nvSpPr>
+          <p:cNvPr id="123" name="TextBox 2">
+            <a:extLst>
+              <a:ext uri="{FF2B5EF4-FFF2-40B4-BE49-F238E27FC236}">
+                <a16:creationId xmlns:a16="http://schemas.microsoft.com/office/drawing/2014/main" id="{956DC4A8-C454-4D0C-A193-B9CF227389CD}"/>
+              </a:ext>
+            </a:extLst>
+          </p:cNvPr>
+          <p:cNvSpPr txBox="1"/>
+          <p:nvPr/>
+        </p:nvSpPr>
+        <p:spPr>
+          <a:xfrm>
+            <a:off x="5889297" y="4800747"/>
+            <a:ext cx="1098724" cy="461665"/>
+          </a:xfrm>
+          <a:prstGeom prst="rect">
+            <a:avLst/>
+          </a:prstGeom>
+          <a:noFill/>
+        </p:spPr>
+        <p:style>
+          <a:lnRef idx="0">
+            <a:scrgbClr r="0" g="0" b="0"/>
+          </a:lnRef>
+          <a:fillRef idx="0">
+            <a:scrgbClr r="0" g="0" b="0"/>
+          </a:fillRef>
+          <a:effectRef idx="0">
+            <a:scrgbClr r="0" g="0" b="0"/>
+          </a:effectRef>
+          <a:fontRef idx="major"/>
+        </p:style>
+        <p:txBody>
+          <a:bodyPr wrap="square" rtlCol="0">
+            <a:spAutoFit/>
+          </a:bodyPr>
+          <a:lstStyle>
+            <a:lvl1pPr>
+              <a:defRPr>
+                <a:latin typeface="+mj-lt"/>
+                <a:ea typeface="+mj-ea"/>
+                <a:cs typeface="+mj-cs"/>
+              </a:defRPr>
+            </a:lvl1pPr>
+            <a:lvl2pPr>
+              <a:defRPr>
+                <a:latin typeface="+mj-lt"/>
+                <a:ea typeface="+mj-ea"/>
+                <a:cs typeface="+mj-cs"/>
+              </a:defRPr>
+            </a:lvl2pPr>
+            <a:lvl3pPr>
+              <a:defRPr>
+                <a:latin typeface="+mj-lt"/>
+                <a:ea typeface="+mj-ea"/>
+                <a:cs typeface="+mj-cs"/>
+              </a:defRPr>
+            </a:lvl3pPr>
+            <a:lvl4pPr>
+              <a:defRPr>
+                <a:latin typeface="+mj-lt"/>
+                <a:ea typeface="+mj-ea"/>
+                <a:cs typeface="+mj-cs"/>
+              </a:defRPr>
+            </a:lvl4pPr>
+            <a:lvl5pPr>
+              <a:defRPr>
+                <a:latin typeface="+mj-lt"/>
+                <a:ea typeface="+mj-ea"/>
+                <a:cs typeface="+mj-cs"/>
+              </a:defRPr>
+            </a:lvl5pPr>
+            <a:lvl6pPr>
+              <a:defRPr>
+                <a:latin typeface="+mj-lt"/>
+                <a:ea typeface="+mj-ea"/>
+                <a:cs typeface="+mj-cs"/>
+              </a:defRPr>
+            </a:lvl6pPr>
+            <a:lvl7pPr>
+              <a:defRPr>
+                <a:latin typeface="+mj-lt"/>
+                <a:ea typeface="+mj-ea"/>
+                <a:cs typeface="+mj-cs"/>
+              </a:defRPr>
+            </a:lvl7pPr>
+            <a:lvl8pPr>
+              <a:defRPr>
+                <a:latin typeface="+mj-lt"/>
+                <a:ea typeface="+mj-ea"/>
+                <a:cs typeface="+mj-cs"/>
+              </a:defRPr>
+            </a:lvl8pPr>
+            <a:lvl9pPr>
+              <a:defRPr>
+                <a:latin typeface="+mj-lt"/>
+                <a:ea typeface="+mj-ea"/>
+                <a:cs typeface="+mj-cs"/>
+              </a:defRPr>
+            </a:lvl9pPr>
+          </a:lstStyle>
+          <a:p>
+            <a:pPr algn="ctr"/>
+            <a:r>
+              <a:rPr lang="en-US" sz="1200" dirty="0">
+                <a:latin typeface="Arial" panose="020B0604020202020204" pitchFamily="34" charset="0"/>
+                <a:cs typeface="Arial" panose="020B0604020202020204" pitchFamily="34" charset="0"/>
+              </a:rPr>
+              <a:t>CloudWatch Log Group</a:t>
+            </a:r>
+          </a:p>
+        </p:txBody>
+      </p:sp>
+      <p:sp>
+        <p:nvSpPr>
+          <p:cNvPr id="130" name="TextBox 129">
+            <a:extLst>
+              <a:ext uri="{FF2B5EF4-FFF2-40B4-BE49-F238E27FC236}">
+                <a16:creationId xmlns:a16="http://schemas.microsoft.com/office/drawing/2014/main" id="{8D4C5C94-FD55-4958-94CD-9C621E29B0AE}"/>
+              </a:ext>
+            </a:extLst>
+          </p:cNvPr>
+          <p:cNvSpPr txBox="1"/>
+          <p:nvPr/>
+        </p:nvSpPr>
+        <p:spPr>
+          <a:xfrm>
+            <a:off x="1641809" y="2718625"/>
+            <a:ext cx="1338642" cy="461665"/>
+          </a:xfrm>
+          <a:prstGeom prst="rect">
+            <a:avLst/>
+          </a:prstGeom>
+          <a:noFill/>
+        </p:spPr>
+        <p:txBody>
+          <a:bodyPr wrap="square" rtlCol="0">
+            <a:spAutoFit/>
+          </a:bodyPr>
+          <a:lstStyle/>
+          <a:p>
+            <a:pPr algn="ctr"/>
+            <a:r>
+              <a:rPr lang="en-US" sz="1200" dirty="0">
+                <a:latin typeface="Arial" panose="020B0604020202020204" pitchFamily="34" charset="0"/>
+                <a:cs typeface="Arial" panose="020B0604020202020204" pitchFamily="34" charset="0"/>
+              </a:rPr>
+              <a:t>AWS CloudFormation</a:t>
+            </a:r>
+          </a:p>
+        </p:txBody>
+      </p:sp>
+      <p:pic>
+        <p:nvPicPr>
+          <p:cNvPr id="138" name="Graphic 13">
+            <a:extLst>
+              <a:ext uri="{FF2B5EF4-FFF2-40B4-BE49-F238E27FC236}">
+                <a16:creationId xmlns:a16="http://schemas.microsoft.com/office/drawing/2014/main" id="{DD93BA21-ED60-4BEA-8CCB-AB48DD1F7F7F}"/>
+              </a:ext>
+            </a:extLst>
+          </p:cNvPr>
+          <p:cNvPicPr>
+            <a:picLocks noChangeAspect="1" noChangeArrowheads="1"/>
+          </p:cNvPicPr>
+          <p:nvPr/>
+        </p:nvPicPr>
+        <p:blipFill>
+          <a:blip r:embed="rId7">
+            <a:extLst>
+              <a:ext uri="{28A0092B-C50C-407E-A947-70E740481C1C}">
+                <a14:useLocalDpi xmlns:a14="http://schemas.microsoft.com/office/drawing/2010/main" val="0"/>
+              </a:ext>
+            </a:extLst>
+          </a:blip>
+          <a:srcRect/>
+          <a:stretch>
+            <a:fillRect/>
+          </a:stretch>
+        </p:blipFill>
+        <p:spPr bwMode="auto">
+          <a:xfrm>
+            <a:off x="6058274" y="2185191"/>
+            <a:ext cx="760770" cy="760770"/>
+          </a:xfrm>
+          <a:prstGeom prst="rect">
+            <a:avLst/>
+          </a:prstGeom>
+          <a:noFill/>
+          <a:ln>
+            <a:noFill/>
+          </a:ln>
+          <a:extLst>
+            <a:ext uri="{909E8E84-426E-40DD-AFC4-6F175D3DCCD1}">
+              <a14:hiddenFill xmlns:a14="http://schemas.microsoft.com/office/drawing/2010/main">
+                <a:solidFill>
+                  <a:srgbClr val="FFFFFF"/>
+                </a:solidFill>
+              </a14:hiddenFill>
+            </a:ext>
+            <a:ext uri="{91240B29-F687-4F45-9708-019B960494DF}">
+              <a14:hiddenLine xmlns:a14="http://schemas.microsoft.com/office/drawing/2010/main" w="9525">
+                <a:solidFill>
+                  <a:srgbClr val="000000"/>
+                </a:solidFill>
+                <a:miter lim="800000"/>
+                <a:headEnd/>
+                <a:tailEnd/>
+              </a14:hiddenLine>
+            </a:ext>
+          </a:extLst>
+        </p:spPr>
+      </p:pic>
+      <p:pic>
+        <p:nvPicPr>
+          <p:cNvPr id="160" name="Graphic 7">
+            <a:extLst>
+              <a:ext uri="{FF2B5EF4-FFF2-40B4-BE49-F238E27FC236}">
+                <a16:creationId xmlns:a16="http://schemas.microsoft.com/office/drawing/2014/main" id="{0B13130F-B51E-4BFD-AECE-120AC8A6CA73}"/>
+              </a:ext>
+            </a:extLst>
+          </p:cNvPr>
+          <p:cNvPicPr>
+            <a:picLocks noChangeAspect="1" noChangeArrowheads="1"/>
+          </p:cNvPicPr>
+          <p:nvPr/>
+        </p:nvPicPr>
+        <p:blipFill>
+          <a:blip r:embed="rId8">
+            <a:extLst>
+              <a:ext uri="{28A0092B-C50C-407E-A947-70E740481C1C}">
+                <a14:useLocalDpi xmlns:a14="http://schemas.microsoft.com/office/drawing/2010/main" val="0"/>
+              </a:ext>
+            </a:extLst>
+          </a:blip>
+          <a:srcRect/>
+          <a:stretch>
+            <a:fillRect/>
+          </a:stretch>
+        </p:blipFill>
+        <p:spPr bwMode="auto">
+          <a:xfrm>
+            <a:off x="6058274" y="4012223"/>
+            <a:ext cx="760770" cy="760770"/>
+          </a:xfrm>
+          <a:prstGeom prst="rect">
+            <a:avLst/>
+          </a:prstGeom>
+          <a:noFill/>
+          <a:ln>
+            <a:noFill/>
+          </a:ln>
+          <a:extLst>
+            <a:ext uri="{909E8E84-426E-40DD-AFC4-6F175D3DCCD1}">
+              <a14:hiddenFill xmlns:a14="http://schemas.microsoft.com/office/drawing/2010/main">
+                <a:solidFill>
+                  <a:srgbClr val="FFFFFF"/>
+                </a:solidFill>
+              </a14:hiddenFill>
+            </a:ext>
+            <a:ext uri="{91240B29-F687-4F45-9708-019B960494DF}">
+              <a14:hiddenLine xmlns:a14="http://schemas.microsoft.com/office/drawing/2010/main" w="9525">
+                <a:solidFill>
+                  <a:srgbClr val="000000"/>
+                </a:solidFill>
+                <a:miter lim="800000"/>
+                <a:headEnd/>
+                <a:tailEnd/>
+              </a14:hiddenLine>
+            </a:ext>
+          </a:extLst>
+        </p:spPr>
+      </p:pic>
+      <p:pic>
+        <p:nvPicPr>
+          <p:cNvPr id="173" name="Graphic 21">
+            <a:extLst>
+              <a:ext uri="{FF2B5EF4-FFF2-40B4-BE49-F238E27FC236}">
+                <a16:creationId xmlns:a16="http://schemas.microsoft.com/office/drawing/2014/main" id="{EE9A2C89-D760-44AD-9846-59BF08E6A6F6}"/>
+              </a:ext>
+            </a:extLst>
+          </p:cNvPr>
+          <p:cNvPicPr>
+            <a:picLocks noChangeAspect="1" noChangeArrowheads="1"/>
+          </p:cNvPicPr>
+          <p:nvPr/>
+        </p:nvPicPr>
+        <p:blipFill>
+          <a:blip r:embed="rId9">
+            <a:extLst>
+              <a:ext uri="{28A0092B-C50C-407E-A947-70E740481C1C}">
+                <a14:useLocalDpi xmlns:a14="http://schemas.microsoft.com/office/drawing/2010/main" val="0"/>
+              </a:ext>
+            </a:extLst>
+          </a:blip>
+          <a:srcRect/>
+          <a:stretch>
+            <a:fillRect/>
+          </a:stretch>
+        </p:blipFill>
+        <p:spPr bwMode="auto">
+          <a:xfrm>
+            <a:off x="1930350" y="1874472"/>
+            <a:ext cx="760770" cy="760770"/>
+          </a:xfrm>
+          <a:prstGeom prst="rect">
+            <a:avLst/>
+          </a:prstGeom>
+          <a:noFill/>
+          <a:ln>
+            <a:noFill/>
+          </a:ln>
+          <a:extLst>
+            <a:ext uri="{909E8E84-426E-40DD-AFC4-6F175D3DCCD1}">
+              <a14:hiddenFill xmlns:a14="http://schemas.microsoft.com/office/drawing/2010/main">
+                <a:solidFill>
+                  <a:srgbClr val="FFFFFF"/>
+                </a:solidFill>
+              </a14:hiddenFill>
+            </a:ext>
+            <a:ext uri="{91240B29-F687-4F45-9708-019B960494DF}">
+              <a14:hiddenLine xmlns:a14="http://schemas.microsoft.com/office/drawing/2010/main" w="9525">
+                <a:solidFill>
+                  <a:srgbClr val="000000"/>
+                </a:solidFill>
+                <a:miter lim="800000"/>
+                <a:headEnd/>
+                <a:tailEnd/>
+              </a14:hiddenLine>
+            </a:ext>
+          </a:extLst>
+        </p:spPr>
+      </p:pic>
+      <p:sp>
+        <p:nvSpPr>
+          <p:cNvPr id="175" name="Rectangle 174">
+            <a:extLst>
+              <a:ext uri="{FF2B5EF4-FFF2-40B4-BE49-F238E27FC236}">
+                <a16:creationId xmlns:a16="http://schemas.microsoft.com/office/drawing/2014/main" id="{E23EF82D-34D3-46B6-978C-7B6A8238A22B}"/>
               </a:ext>
             </a:extLst>
           </p:cNvPr>
@@ -4113,8 +4445,157 @@
         </p:nvSpPr>
         <p:spPr>
           <a:xfrm>
-            <a:off x="4410764" y="2037086"/>
-            <a:ext cx="253435" cy="212902"/>
+            <a:off x="1359827" y="993057"/>
+            <a:ext cx="9424877" cy="5274236"/>
+          </a:xfrm>
+          <a:prstGeom prst="rect">
+            <a:avLst/>
+          </a:prstGeom>
+          <a:noFill/>
+          <a:ln w="12700">
+            <a:solidFill>
+              <a:srgbClr val="5B9CD5"/>
+            </a:solidFill>
+            <a:prstDash val="sysDash"/>
+          </a:ln>
+        </p:spPr>
+        <p:style>
+          <a:lnRef idx="2">
+            <a:schemeClr val="accent1">
+              <a:shade val="50000"/>
+            </a:schemeClr>
+          </a:lnRef>
+          <a:fillRef idx="1">
+            <a:schemeClr val="accent1"/>
+          </a:fillRef>
+          <a:effectRef idx="0">
+            <a:schemeClr val="accent1"/>
+          </a:effectRef>
+          <a:fontRef idx="minor">
+            <a:schemeClr val="lt1"/>
+          </a:fontRef>
+        </p:style>
+        <p:txBody>
+          <a:bodyPr lIns="502920" tIns="91440"/>
+          <a:lstStyle/>
+          <a:p>
+            <a:pPr eaLnBrk="1" fontAlgn="auto" hangingPunct="1">
+              <a:spcBef>
+                <a:spcPts val="0"/>
+              </a:spcBef>
+              <a:spcAft>
+                <a:spcPts val="0"/>
+              </a:spcAft>
+              <a:defRPr/>
+            </a:pPr>
+            <a:r>
+              <a:rPr lang="en-US" sz="1200" dirty="0">
+                <a:solidFill>
+                  <a:srgbClr val="5B9CD5"/>
+                </a:solidFill>
+                <a:latin typeface="Arial" panose="020B0604020202020204" pitchFamily="34" charset="0"/>
+                <a:cs typeface="Arial" panose="020B0604020202020204" pitchFamily="34" charset="0"/>
+              </a:rPr>
+              <a:t>   Home Region</a:t>
+            </a:r>
+          </a:p>
+        </p:txBody>
+      </p:sp>
+      <p:pic>
+        <p:nvPicPr>
+          <p:cNvPr id="176" name="Graphic 175">
+            <a:extLst>
+              <a:ext uri="{FF2B5EF4-FFF2-40B4-BE49-F238E27FC236}">
+                <a16:creationId xmlns:a16="http://schemas.microsoft.com/office/drawing/2014/main" id="{79BE28C9-BA1C-439C-A7D3-8AB7EFF8AFC4}"/>
+              </a:ext>
+            </a:extLst>
+          </p:cNvPr>
+          <p:cNvPicPr>
+            <a:picLocks noChangeAspect="1"/>
+          </p:cNvPicPr>
+          <p:nvPr/>
+        </p:nvPicPr>
+        <p:blipFill>
+          <a:blip r:embed="rId10">
+            <a:extLst>
+              <a:ext uri="{96DAC541-7B7A-43D3-8B79-37D633B846F1}">
+                <asvg:svgBlip xmlns:asvg="http://schemas.microsoft.com/office/drawing/2016/SVG/main" r:embed="rId11"/>
+              </a:ext>
+            </a:extLst>
+          </a:blip>
+          <a:stretch>
+            <a:fillRect/>
+          </a:stretch>
+        </p:blipFill>
+        <p:spPr>
+          <a:xfrm>
+            <a:off x="1352415" y="993057"/>
+            <a:ext cx="537059" cy="537059"/>
+          </a:xfrm>
+          <a:prstGeom prst="rect">
+            <a:avLst/>
+          </a:prstGeom>
+        </p:spPr>
+      </p:pic>
+      <p:cxnSp>
+        <p:nvCxnSpPr>
+          <p:cNvPr id="177" name="Straight Arrow Connector 176">
+            <a:extLst>
+              <a:ext uri="{FF2B5EF4-FFF2-40B4-BE49-F238E27FC236}">
+                <a16:creationId xmlns:a16="http://schemas.microsoft.com/office/drawing/2014/main" id="{4A73DC17-2E0A-47FF-927C-2082DB636979}"/>
+              </a:ext>
+            </a:extLst>
+          </p:cNvPr>
+          <p:cNvCxnSpPr>
+            <a:cxnSpLocks/>
+            <a:stCxn id="122" idx="2"/>
+            <a:endCxn id="160" idx="0"/>
+          </p:cNvCxnSpPr>
+          <p:nvPr/>
+        </p:nvCxnSpPr>
+        <p:spPr>
+          <a:xfrm flipH="1">
+            <a:off x="6438659" y="3187665"/>
+            <a:ext cx="5081" cy="824558"/>
+          </a:xfrm>
+          <a:prstGeom prst="straightConnector1">
+            <a:avLst/>
+          </a:prstGeom>
+          <a:ln>
+            <a:tailEnd type="triangle"/>
+          </a:ln>
+        </p:spPr>
+        <p:style>
+          <a:lnRef idx="1">
+            <a:schemeClr val="dk1"/>
+          </a:lnRef>
+          <a:fillRef idx="0">
+            <a:schemeClr val="dk1"/>
+          </a:fillRef>
+          <a:effectRef idx="0">
+            <a:schemeClr val="dk1"/>
+          </a:effectRef>
+          <a:fontRef idx="minor">
+            <a:schemeClr val="tx1"/>
+          </a:fontRef>
+        </p:style>
+      </p:cxnSp>
+      <p:sp>
+        <p:nvSpPr>
+          <p:cNvPr id="235" name="Oval 234">
+            <a:extLst>
+              <a:ext uri="{FF2B5EF4-FFF2-40B4-BE49-F238E27FC236}">
+                <a16:creationId xmlns:a16="http://schemas.microsoft.com/office/drawing/2014/main" id="{1BDB1ABD-271A-40FF-9892-B5B91A5F6E19}"/>
+              </a:ext>
+            </a:extLst>
+          </p:cNvPr>
+          <p:cNvSpPr/>
+          <p:nvPr/>
+        </p:nvSpPr>
+        <p:spPr>
+          <a:xfrm>
+            <a:off x="754270" y="1178840"/>
+            <a:ext cx="356742" cy="291049"/>
           </a:xfrm>
           <a:prstGeom prst="ellipse">
             <a:avLst/>
@@ -4161,10 +4642,376 @@
       </p:sp>
       <p:sp>
         <p:nvSpPr>
-          <p:cNvPr id="227" name="Oval 226">
-            <a:extLst>
-              <a:ext uri="{FF2B5EF4-FFF2-40B4-BE49-F238E27FC236}">
-                <a16:creationId xmlns:a16="http://schemas.microsoft.com/office/drawing/2014/main" id="{F0D1735B-0005-B145-8C48-3E3934A1D64E}"/>
+          <p:cNvPr id="104" name="TextBox 103">
+            <a:extLst>
+              <a:ext uri="{FF2B5EF4-FFF2-40B4-BE49-F238E27FC236}">
+                <a16:creationId xmlns:a16="http://schemas.microsoft.com/office/drawing/2014/main" id="{FAA82B51-6E98-0AF9-5BD6-B0B4BEC402B7}"/>
+              </a:ext>
+            </a:extLst>
+          </p:cNvPr>
+          <p:cNvSpPr txBox="1"/>
+          <p:nvPr/>
+        </p:nvSpPr>
+        <p:spPr>
+          <a:xfrm>
+            <a:off x="1737655" y="5847926"/>
+            <a:ext cx="1103001" cy="276999"/>
+          </a:xfrm>
+          <a:prstGeom prst="rect">
+            <a:avLst/>
+          </a:prstGeom>
+          <a:noFill/>
+        </p:spPr>
+        <p:txBody>
+          <a:bodyPr wrap="square" rtlCol="0">
+            <a:spAutoFit/>
+          </a:bodyPr>
+          <a:lstStyle/>
+          <a:p>
+            <a:pPr algn="ctr"/>
+            <a:r>
+              <a:rPr lang="en-US" sz="1200" dirty="0">
+                <a:latin typeface="Arial" panose="020B0604020202020204" pitchFamily="34" charset="0"/>
+                <a:cs typeface="Arial" panose="020B0604020202020204" pitchFamily="34" charset="0"/>
+              </a:rPr>
+              <a:t>Lambda Role</a:t>
+            </a:r>
+          </a:p>
+        </p:txBody>
+      </p:sp>
+      <p:pic>
+        <p:nvPicPr>
+          <p:cNvPr id="105" name="Graphic 104">
+            <a:extLst>
+              <a:ext uri="{FF2B5EF4-FFF2-40B4-BE49-F238E27FC236}">
+                <a16:creationId xmlns:a16="http://schemas.microsoft.com/office/drawing/2014/main" id="{D19144BD-63B5-E1C9-A3D2-74AAD0B20668}"/>
+              </a:ext>
+            </a:extLst>
+          </p:cNvPr>
+          <p:cNvPicPr>
+            <a:picLocks noChangeAspect="1"/>
+          </p:cNvPicPr>
+          <p:nvPr/>
+        </p:nvPicPr>
+        <p:blipFill>
+          <a:blip r:embed="rId12">
+            <a:extLst>
+              <a:ext uri="{96DAC541-7B7A-43D3-8B79-37D633B846F1}">
+                <asvg:svgBlip xmlns:asvg="http://schemas.microsoft.com/office/drawing/2016/SVG/main" r:embed="rId13"/>
+              </a:ext>
+            </a:extLst>
+          </a:blip>
+          <a:stretch>
+            <a:fillRect/>
+          </a:stretch>
+        </p:blipFill>
+        <p:spPr>
+          <a:xfrm>
+            <a:off x="1908771" y="5087156"/>
+            <a:ext cx="760770" cy="760770"/>
+          </a:xfrm>
+          <a:prstGeom prst="rect">
+            <a:avLst/>
+          </a:prstGeom>
+        </p:spPr>
+      </p:pic>
+      <p:cxnSp>
+        <p:nvCxnSpPr>
+          <p:cNvPr id="13" name="Straight Arrow Connector 12">
+            <a:extLst>
+              <a:ext uri="{FF2B5EF4-FFF2-40B4-BE49-F238E27FC236}">
+                <a16:creationId xmlns:a16="http://schemas.microsoft.com/office/drawing/2014/main" id="{44BA7D71-1277-AC0A-95CF-F3E8F899F429}"/>
+              </a:ext>
+            </a:extLst>
+          </p:cNvPr>
+          <p:cNvCxnSpPr>
+            <a:cxnSpLocks/>
+          </p:cNvCxnSpPr>
+          <p:nvPr/>
+        </p:nvCxnSpPr>
+        <p:spPr>
+          <a:xfrm>
+            <a:off x="6945851" y="2565576"/>
+            <a:ext cx="994641" cy="3182"/>
+          </a:xfrm>
+          <a:prstGeom prst="straightConnector1">
+            <a:avLst/>
+          </a:prstGeom>
+          <a:ln>
+            <a:tailEnd type="triangle"/>
+          </a:ln>
+        </p:spPr>
+        <p:style>
+          <a:lnRef idx="1">
+            <a:schemeClr val="dk1"/>
+          </a:lnRef>
+          <a:fillRef idx="0">
+            <a:schemeClr val="dk1"/>
+          </a:fillRef>
+          <a:effectRef idx="0">
+            <a:schemeClr val="dk1"/>
+          </a:effectRef>
+          <a:fontRef idx="minor">
+            <a:schemeClr val="tx1"/>
+          </a:fontRef>
+        </p:style>
+      </p:cxnSp>
+      <p:pic>
+        <p:nvPicPr>
+          <p:cNvPr id="12" name="Graphic 19" descr="AWS CodeBuild service icon.">
+            <a:extLst>
+              <a:ext uri="{FF2B5EF4-FFF2-40B4-BE49-F238E27FC236}">
+                <a16:creationId xmlns:a16="http://schemas.microsoft.com/office/drawing/2014/main" id="{2AC95550-4CB9-684D-7F1E-B24204A7EE7A}"/>
+              </a:ext>
+            </a:extLst>
+          </p:cNvPr>
+          <p:cNvPicPr>
+            <a:picLocks noChangeAspect="1" noChangeArrowheads="1"/>
+          </p:cNvPicPr>
+          <p:nvPr/>
+        </p:nvPicPr>
+        <p:blipFill>
+          <a:blip r:embed="rId14">
+            <a:extLst>
+              <a:ext uri="{96DAC541-7B7A-43D3-8B79-37D633B846F1}">
+                <asvg:svgBlip xmlns:asvg="http://schemas.microsoft.com/office/drawing/2016/SVG/main" r:embed="rId15"/>
+              </a:ext>
+            </a:extLst>
+          </a:blip>
+          <a:srcRect/>
+          <a:stretch/>
+        </p:blipFill>
+        <p:spPr bwMode="auto">
+          <a:xfrm>
+            <a:off x="8080268" y="2188373"/>
+            <a:ext cx="760770" cy="760770"/>
+          </a:xfrm>
+          <a:prstGeom prst="rect">
+            <a:avLst/>
+          </a:prstGeom>
+          <a:noFill/>
+          <a:ln>
+            <a:noFill/>
+          </a:ln>
+          <a:extLst>
+            <a:ext uri="{909E8E84-426E-40DD-AFC4-6F175D3DCCD1}">
+              <a14:hiddenFill xmlns:a14="http://schemas.microsoft.com/office/drawing/2010/main">
+                <a:solidFill>
+                  <a:srgbClr val="FFFFFF"/>
+                </a:solidFill>
+              </a14:hiddenFill>
+            </a:ext>
+            <a:ext uri="{91240B29-F687-4F45-9708-019B960494DF}">
+              <a14:hiddenLine xmlns:a14="http://schemas.microsoft.com/office/drawing/2010/main" w="9525">
+                <a:solidFill>
+                  <a:srgbClr val="000000"/>
+                </a:solidFill>
+                <a:miter lim="800000"/>
+                <a:headEnd/>
+                <a:tailEnd/>
+              </a14:hiddenLine>
+            </a:ext>
+          </a:extLst>
+        </p:spPr>
+      </p:pic>
+      <p:sp>
+        <p:nvSpPr>
+          <p:cNvPr id="14" name="TextBox 11">
+            <a:extLst>
+              <a:ext uri="{FF2B5EF4-FFF2-40B4-BE49-F238E27FC236}">
+                <a16:creationId xmlns:a16="http://schemas.microsoft.com/office/drawing/2014/main" id="{28580F6A-78E0-AE44-4956-CFE18797EB77}"/>
+              </a:ext>
+            </a:extLst>
+          </p:cNvPr>
+          <p:cNvSpPr txBox="1">
+            <a:spLocks noChangeArrowheads="1"/>
+          </p:cNvSpPr>
+          <p:nvPr/>
+        </p:nvSpPr>
+        <p:spPr bwMode="auto">
+          <a:xfrm>
+            <a:off x="7670148" y="2910665"/>
+            <a:ext cx="1581010" cy="276999"/>
+          </a:xfrm>
+          <a:prstGeom prst="rect">
+            <a:avLst/>
+          </a:prstGeom>
+          <a:noFill/>
+          <a:ln>
+            <a:noFill/>
+          </a:ln>
+          <a:extLst>
+            <a:ext uri="{909E8E84-426E-40DD-AFC4-6F175D3DCCD1}">
+              <a14:hiddenFill xmlns:a14="http://schemas.microsoft.com/office/drawing/2010/main">
+                <a:solidFill>
+                  <a:srgbClr val="FFFFFF"/>
+                </a:solidFill>
+              </a14:hiddenFill>
+            </a:ext>
+            <a:ext uri="{91240B29-F687-4F45-9708-019B960494DF}">
+              <a14:hiddenLine xmlns:a14="http://schemas.microsoft.com/office/drawing/2010/main" w="9525">
+                <a:solidFill>
+                  <a:srgbClr val="000000"/>
+                </a:solidFill>
+                <a:miter lim="800000"/>
+                <a:headEnd/>
+                <a:tailEnd/>
+              </a14:hiddenLine>
+            </a:ext>
+          </a:extLst>
+        </p:spPr>
+        <p:style>
+          <a:lnRef idx="0">
+            <a:scrgbClr r="0" g="0" b="0"/>
+          </a:lnRef>
+          <a:fillRef idx="0">
+            <a:scrgbClr r="0" g="0" b="0"/>
+          </a:fillRef>
+          <a:effectRef idx="0">
+            <a:scrgbClr r="0" g="0" b="0"/>
+          </a:effectRef>
+          <a:fontRef idx="major"/>
+        </p:style>
+        <p:txBody>
+          <a:bodyPr wrap="square">
+            <a:spAutoFit/>
+          </a:bodyPr>
+          <a:lstStyle>
+            <a:lvl1pPr>
+              <a:defRPr>
+                <a:latin typeface="+mj-lt"/>
+                <a:ea typeface="+mj-ea"/>
+                <a:cs typeface="+mj-cs"/>
+              </a:defRPr>
+            </a:lvl1pPr>
+            <a:lvl2pPr>
+              <a:defRPr>
+                <a:latin typeface="+mj-lt"/>
+                <a:ea typeface="+mj-ea"/>
+                <a:cs typeface="+mj-cs"/>
+              </a:defRPr>
+            </a:lvl2pPr>
+            <a:lvl3pPr>
+              <a:defRPr>
+                <a:latin typeface="+mj-lt"/>
+                <a:ea typeface="+mj-ea"/>
+                <a:cs typeface="+mj-cs"/>
+              </a:defRPr>
+            </a:lvl3pPr>
+            <a:lvl4pPr>
+              <a:defRPr>
+                <a:latin typeface="+mj-lt"/>
+                <a:ea typeface="+mj-ea"/>
+                <a:cs typeface="+mj-cs"/>
+              </a:defRPr>
+            </a:lvl4pPr>
+            <a:lvl5pPr>
+              <a:defRPr>
+                <a:latin typeface="+mj-lt"/>
+                <a:ea typeface="+mj-ea"/>
+                <a:cs typeface="+mj-cs"/>
+              </a:defRPr>
+            </a:lvl5pPr>
+            <a:lvl6pPr>
+              <a:defRPr>
+                <a:latin typeface="+mj-lt"/>
+                <a:ea typeface="+mj-ea"/>
+                <a:cs typeface="+mj-cs"/>
+              </a:defRPr>
+            </a:lvl6pPr>
+            <a:lvl7pPr>
+              <a:defRPr>
+                <a:latin typeface="+mj-lt"/>
+                <a:ea typeface="+mj-ea"/>
+                <a:cs typeface="+mj-cs"/>
+              </a:defRPr>
+            </a:lvl7pPr>
+            <a:lvl8pPr>
+              <a:defRPr>
+                <a:latin typeface="+mj-lt"/>
+                <a:ea typeface="+mj-ea"/>
+                <a:cs typeface="+mj-cs"/>
+              </a:defRPr>
+            </a:lvl8pPr>
+            <a:lvl9pPr>
+              <a:defRPr>
+                <a:latin typeface="+mj-lt"/>
+                <a:ea typeface="+mj-ea"/>
+                <a:cs typeface="+mj-cs"/>
+              </a:defRPr>
+            </a:lvl9pPr>
+          </a:lstStyle>
+          <a:p>
+            <a:pPr algn="ctr" eaLnBrk="1" hangingPunct="1"/>
+            <a:r>
+              <a:rPr lang="en-US" altLang="en-US" sz="1200" dirty="0">
+                <a:latin typeface="Arial" panose="020B0604020202020204" pitchFamily="34" charset="0"/>
+                <a:ea typeface="Amazon Ember" panose="020B0603020204020204" pitchFamily="34" charset="0"/>
+                <a:cs typeface="Arial" panose="020B0604020202020204" pitchFamily="34" charset="0"/>
+              </a:rPr>
+              <a:t>AWS </a:t>
+            </a:r>
+            <a:r>
+              <a:rPr lang="en-US" altLang="en-US" sz="1200" dirty="0" err="1">
+                <a:latin typeface="Arial" panose="020B0604020202020204" pitchFamily="34" charset="0"/>
+                <a:ea typeface="Amazon Ember" panose="020B0603020204020204" pitchFamily="34" charset="0"/>
+                <a:cs typeface="Arial" panose="020B0604020202020204" pitchFamily="34" charset="0"/>
+              </a:rPr>
+              <a:t>CodeBuild</a:t>
+            </a:r>
+            <a:endParaRPr lang="en-US" altLang="en-US" sz="1200" dirty="0">
+              <a:latin typeface="Arial" panose="020B0604020202020204" pitchFamily="34" charset="0"/>
+              <a:ea typeface="Amazon Ember" panose="020B0603020204020204" pitchFamily="34" charset="0"/>
+              <a:cs typeface="Arial" panose="020B0604020202020204" pitchFamily="34" charset="0"/>
+            </a:endParaRPr>
+          </a:p>
+        </p:txBody>
+      </p:sp>
+      <p:sp>
+        <p:nvSpPr>
+          <p:cNvPr id="21" name="TextBox 20">
+            <a:extLst>
+              <a:ext uri="{FF2B5EF4-FFF2-40B4-BE49-F238E27FC236}">
+                <a16:creationId xmlns:a16="http://schemas.microsoft.com/office/drawing/2014/main" id="{BC6A5763-5D15-3E92-6EB9-B88E33390E39}"/>
+              </a:ext>
+            </a:extLst>
+          </p:cNvPr>
+          <p:cNvSpPr txBox="1"/>
+          <p:nvPr/>
+        </p:nvSpPr>
+        <p:spPr>
+          <a:xfrm>
+            <a:off x="1366366" y="4265821"/>
+            <a:ext cx="1888737" cy="461665"/>
+          </a:xfrm>
+          <a:prstGeom prst="rect">
+            <a:avLst/>
+          </a:prstGeom>
+          <a:noFill/>
+        </p:spPr>
+        <p:txBody>
+          <a:bodyPr wrap="square" rtlCol="0">
+            <a:spAutoFit/>
+          </a:bodyPr>
+          <a:lstStyle/>
+          <a:p>
+            <a:pPr algn="ctr"/>
+            <a:r>
+              <a:rPr lang="en-US" sz="1200" dirty="0">
+                <a:latin typeface="Arial" panose="020B0604020202020204" pitchFamily="34" charset="0"/>
+                <a:cs typeface="Arial" panose="020B0604020202020204" pitchFamily="34" charset="0"/>
+              </a:rPr>
+              <a:t>CFCT CloudFormation Stack</a:t>
+            </a:r>
+          </a:p>
+        </p:txBody>
+      </p:sp>
+      <p:sp>
+        <p:nvSpPr>
+          <p:cNvPr id="26" name="Oval 25">
+            <a:extLst>
+              <a:ext uri="{FF2B5EF4-FFF2-40B4-BE49-F238E27FC236}">
+                <a16:creationId xmlns:a16="http://schemas.microsoft.com/office/drawing/2014/main" id="{F9E1D65C-4C87-D4A6-EFC6-5908E824BC56}"/>
               </a:ext>
             </a:extLst>
           </p:cNvPr>
@@ -4173,8 +5020,8 @@
         </p:nvSpPr>
         <p:spPr>
           <a:xfrm>
-            <a:off x="5200547" y="3079919"/>
-            <a:ext cx="253435" cy="212902"/>
+            <a:off x="1751979" y="1687256"/>
+            <a:ext cx="356742" cy="291049"/>
           </a:xfrm>
           <a:prstGeom prst="ellipse">
             <a:avLst/>
@@ -4221,10 +5068,10 @@
       </p:sp>
       <p:sp>
         <p:nvSpPr>
-          <p:cNvPr id="68" name="Rectangle 67">
-            <a:extLst>
-              <a:ext uri="{FF2B5EF4-FFF2-40B4-BE49-F238E27FC236}">
-                <a16:creationId xmlns:a16="http://schemas.microsoft.com/office/drawing/2014/main" id="{F56113B6-D718-8249-9540-C31B7D054BDD}"/>
+          <p:cNvPr id="28" name="Oval 27">
+            <a:extLst>
+              <a:ext uri="{FF2B5EF4-FFF2-40B4-BE49-F238E27FC236}">
+                <a16:creationId xmlns:a16="http://schemas.microsoft.com/office/drawing/2014/main" id="{3DF0751E-5205-038F-D1FD-F1C29BD9B219}"/>
               </a:ext>
             </a:extLst>
           </p:cNvPr>
@@ -4233,303 +5080,8 @@
         </p:nvSpPr>
         <p:spPr>
           <a:xfrm>
-            <a:off x="4588922" y="2509737"/>
-            <a:ext cx="3426670" cy="1828799"/>
-          </a:xfrm>
-          <a:prstGeom prst="rect">
-            <a:avLst/>
-          </a:prstGeom>
-          <a:noFill/>
-          <a:ln w="12700">
-            <a:solidFill>
-              <a:schemeClr val="tx1"/>
-            </a:solidFill>
-            <a:prstDash val="dash"/>
-          </a:ln>
-        </p:spPr>
-        <p:style>
-          <a:lnRef idx="2">
-            <a:schemeClr val="accent1">
-              <a:shade val="50000"/>
-            </a:schemeClr>
-          </a:lnRef>
-          <a:fillRef idx="1">
-            <a:schemeClr val="accent1"/>
-          </a:fillRef>
-          <a:effectRef idx="0">
-            <a:schemeClr val="accent1"/>
-          </a:effectRef>
-          <a:fontRef idx="minor">
-            <a:schemeClr val="lt1"/>
-          </a:fontRef>
-        </p:style>
-        <p:txBody>
-          <a:bodyPr rot="0" spcFirstLastPara="0" vertOverflow="overflow" horzOverflow="overflow" vert="horz" wrap="square" lIns="45720" tIns="0" rIns="0" bIns="0" numCol="1" spcCol="0" rtlCol="0" fromWordArt="0" anchor="t" anchorCtr="0" forceAA="0" compatLnSpc="1">
-            <a:noAutofit/>
-          </a:bodyPr>
-          <a:lstStyle/>
-          <a:p>
-            <a:r>
-              <a:rPr lang="en-US" sz="1100" b="1" dirty="0">
-                <a:solidFill>
-                  <a:schemeClr val="tx1"/>
-                </a:solidFill>
-                <a:latin typeface="Arial" panose="020B0604020202020204" pitchFamily="34" charset="0"/>
-                <a:cs typeface="Arial" panose="020B0604020202020204" pitchFamily="34" charset="0"/>
-              </a:rPr>
-              <a:t>Home-region</a:t>
-            </a:r>
-          </a:p>
-        </p:txBody>
-      </p:sp>
-      <p:sp>
-        <p:nvSpPr>
-          <p:cNvPr id="78" name="TextBox 31">
-            <a:extLst>
-              <a:ext uri="{FF2B5EF4-FFF2-40B4-BE49-F238E27FC236}">
-                <a16:creationId xmlns:a16="http://schemas.microsoft.com/office/drawing/2014/main" id="{41781371-D112-9343-B6E0-D4F1AAF40247}"/>
-              </a:ext>
-            </a:extLst>
-          </p:cNvPr>
-          <p:cNvSpPr txBox="1">
-            <a:spLocks noChangeArrowheads="1"/>
-          </p:cNvSpPr>
-          <p:nvPr/>
-        </p:nvSpPr>
-        <p:spPr bwMode="auto">
-          <a:xfrm>
-            <a:off x="6139004" y="3503072"/>
-            <a:ext cx="1685071" cy="430887"/>
-          </a:xfrm>
-          <a:prstGeom prst="rect">
-            <a:avLst/>
-          </a:prstGeom>
-          <a:noFill/>
-          <a:ln>
-            <a:noFill/>
-          </a:ln>
-          <a:extLst>
-            <a:ext uri="{909E8E84-426E-40DD-AFC4-6F175D3DCCD1}">
-              <a14:hiddenFill xmlns:a14="http://schemas.microsoft.com/office/drawing/2010/main">
-                <a:solidFill>
-                  <a:srgbClr val="FFFFFF"/>
-                </a:solidFill>
-              </a14:hiddenFill>
-            </a:ext>
-            <a:ext uri="{91240B29-F687-4F45-9708-019B960494DF}">
-              <a14:hiddenLine xmlns:a14="http://schemas.microsoft.com/office/drawing/2010/main" w="9525">
-                <a:solidFill>
-                  <a:srgbClr val="000000"/>
-                </a:solidFill>
-                <a:miter lim="800000"/>
-                <a:headEnd/>
-                <a:tailEnd/>
-              </a14:hiddenLine>
-            </a:ext>
-          </a:extLst>
-        </p:spPr>
-        <p:txBody>
-          <a:bodyPr wrap="square">
-            <a:spAutoFit/>
-          </a:bodyPr>
-          <a:lstStyle>
-            <a:lvl1pPr>
-              <a:defRPr>
-                <a:solidFill>
-                  <a:schemeClr val="tx1"/>
-                </a:solidFill>
-                <a:latin typeface="Calibri" panose="020F0502020204030204" pitchFamily="34" charset="0"/>
-              </a:defRPr>
-            </a:lvl1pPr>
-            <a:lvl2pPr marL="742950" indent="-285750">
-              <a:defRPr>
-                <a:solidFill>
-                  <a:schemeClr val="tx1"/>
-                </a:solidFill>
-                <a:latin typeface="Calibri" panose="020F0502020204030204" pitchFamily="34" charset="0"/>
-              </a:defRPr>
-            </a:lvl2pPr>
-            <a:lvl3pPr marL="1143000" indent="-228600">
-              <a:defRPr>
-                <a:solidFill>
-                  <a:schemeClr val="tx1"/>
-                </a:solidFill>
-                <a:latin typeface="Calibri" panose="020F0502020204030204" pitchFamily="34" charset="0"/>
-              </a:defRPr>
-            </a:lvl3pPr>
-            <a:lvl4pPr marL="1600200" indent="-228600">
-              <a:defRPr>
-                <a:solidFill>
-                  <a:schemeClr val="tx1"/>
-                </a:solidFill>
-                <a:latin typeface="Calibri" panose="020F0502020204030204" pitchFamily="34" charset="0"/>
-              </a:defRPr>
-            </a:lvl4pPr>
-            <a:lvl5pPr marL="2057400" indent="-228600">
-              <a:defRPr>
-                <a:solidFill>
-                  <a:schemeClr val="tx1"/>
-                </a:solidFill>
-                <a:latin typeface="Calibri" panose="020F0502020204030204" pitchFamily="34" charset="0"/>
-              </a:defRPr>
-            </a:lvl5pPr>
-            <a:lvl6pPr marL="2514600" indent="-228600" eaLnBrk="0" fontAlgn="base" hangingPunct="0">
-              <a:spcBef>
-                <a:spcPct val="0"/>
-              </a:spcBef>
-              <a:spcAft>
-                <a:spcPct val="0"/>
-              </a:spcAft>
-              <a:defRPr>
-                <a:solidFill>
-                  <a:schemeClr val="tx1"/>
-                </a:solidFill>
-                <a:latin typeface="Calibri" panose="020F0502020204030204" pitchFamily="34" charset="0"/>
-              </a:defRPr>
-            </a:lvl6pPr>
-            <a:lvl7pPr marL="2971800" indent="-228600" eaLnBrk="0" fontAlgn="base" hangingPunct="0">
-              <a:spcBef>
-                <a:spcPct val="0"/>
-              </a:spcBef>
-              <a:spcAft>
-                <a:spcPct val="0"/>
-              </a:spcAft>
-              <a:defRPr>
-                <a:solidFill>
-                  <a:schemeClr val="tx1"/>
-                </a:solidFill>
-                <a:latin typeface="Calibri" panose="020F0502020204030204" pitchFamily="34" charset="0"/>
-              </a:defRPr>
-            </a:lvl7pPr>
-            <a:lvl8pPr marL="3429000" indent="-228600" eaLnBrk="0" fontAlgn="base" hangingPunct="0">
-              <a:spcBef>
-                <a:spcPct val="0"/>
-              </a:spcBef>
-              <a:spcAft>
-                <a:spcPct val="0"/>
-              </a:spcAft>
-              <a:defRPr>
-                <a:solidFill>
-                  <a:schemeClr val="tx1"/>
-                </a:solidFill>
-                <a:latin typeface="Calibri" panose="020F0502020204030204" pitchFamily="34" charset="0"/>
-              </a:defRPr>
-            </a:lvl8pPr>
-            <a:lvl9pPr marL="3886200" indent="-228600" eaLnBrk="0" fontAlgn="base" hangingPunct="0">
-              <a:spcBef>
-                <a:spcPct val="0"/>
-              </a:spcBef>
-              <a:spcAft>
-                <a:spcPct val="0"/>
-              </a:spcAft>
-              <a:defRPr>
-                <a:solidFill>
-                  <a:schemeClr val="tx1"/>
-                </a:solidFill>
-                <a:latin typeface="Calibri" panose="020F0502020204030204" pitchFamily="34" charset="0"/>
-              </a:defRPr>
-            </a:lvl9pPr>
-          </a:lstStyle>
-          <a:p>
-            <a:pPr algn="ctr" eaLnBrk="1" hangingPunct="1"/>
-            <a:r>
-              <a:rPr lang="en-US" altLang="en-US" sz="1100" dirty="0">
-                <a:latin typeface="Arial" panose="020B0604020202020204" pitchFamily="34" charset="0"/>
-                <a:ea typeface="Amazon Ember" panose="020B0603020204020204" pitchFamily="34" charset="0"/>
-                <a:cs typeface="Arial" panose="020B0604020202020204" pitchFamily="34" charset="0"/>
-              </a:rPr>
-              <a:t>CFCT </a:t>
-            </a:r>
-          </a:p>
-          <a:p>
-            <a:pPr algn="ctr" eaLnBrk="1" hangingPunct="1"/>
-            <a:r>
-              <a:rPr lang="en-US" altLang="en-US" sz="1100" dirty="0">
-                <a:latin typeface="Arial" panose="020B0604020202020204" pitchFamily="34" charset="0"/>
-                <a:ea typeface="Amazon Ember" panose="020B0603020204020204" pitchFamily="34" charset="0"/>
-                <a:cs typeface="Arial" panose="020B0604020202020204" pitchFamily="34" charset="0"/>
-              </a:rPr>
-              <a:t>CloudFormation Stack</a:t>
-            </a:r>
-          </a:p>
-        </p:txBody>
-      </p:sp>
-      <p:pic>
-        <p:nvPicPr>
-          <p:cNvPr id="74" name="Graphic 34">
-            <a:extLst>
-              <a:ext uri="{FF2B5EF4-FFF2-40B4-BE49-F238E27FC236}">
-                <a16:creationId xmlns:a16="http://schemas.microsoft.com/office/drawing/2014/main" id="{7E9A781E-A35E-C242-A3B9-6FC6A310B8CF}"/>
-              </a:ext>
-            </a:extLst>
-          </p:cNvPr>
-          <p:cNvPicPr>
-            <a:picLocks noChangeAspect="1" noChangeArrowheads="1"/>
-          </p:cNvPicPr>
-          <p:nvPr/>
-        </p:nvPicPr>
-        <p:blipFill>
-          <a:blip r:embed="rId7">
-            <a:extLst>
-              <a:ext uri="{28A0092B-C50C-407E-A947-70E740481C1C}">
-                <a14:useLocalDpi xmlns:a14="http://schemas.microsoft.com/office/drawing/2010/main" val="0"/>
-              </a:ext>
-            </a:extLst>
-          </a:blip>
-          <a:srcRect/>
-          <a:stretch>
-            <a:fillRect/>
-          </a:stretch>
-        </p:blipFill>
-        <p:spPr bwMode="auto">
-          <a:xfrm>
-            <a:off x="6745171" y="3079919"/>
-            <a:ext cx="457200" cy="457200"/>
-          </a:xfrm>
-          <a:prstGeom prst="rect">
-            <a:avLst/>
-          </a:prstGeom>
-          <a:noFill/>
-          <a:ln>
-            <a:noFill/>
-          </a:ln>
-          <a:extLst>
-            <a:ext uri="{909E8E84-426E-40DD-AFC4-6F175D3DCCD1}">
-              <a14:hiddenFill xmlns:a14="http://schemas.microsoft.com/office/drawing/2010/main">
-                <a:solidFill>
-                  <a:srgbClr val="FFFFFF"/>
-                </a:solidFill>
-              </a14:hiddenFill>
-            </a:ext>
-            <a:ext uri="{91240B29-F687-4F45-9708-019B960494DF}">
-              <a14:hiddenLine xmlns:a14="http://schemas.microsoft.com/office/drawing/2010/main" w="9525">
-                <a:solidFill>
-                  <a:srgbClr val="000000"/>
-                </a:solidFill>
-                <a:miter lim="800000"/>
-                <a:headEnd/>
-                <a:tailEnd/>
-              </a14:hiddenLine>
-            </a:ext>
-          </a:extLst>
-        </p:spPr>
-      </p:pic>
-      <p:sp>
-        <p:nvSpPr>
-          <p:cNvPr id="89" name="Oval 88">
-            <a:extLst>
-              <a:ext uri="{FF2B5EF4-FFF2-40B4-BE49-F238E27FC236}">
-                <a16:creationId xmlns:a16="http://schemas.microsoft.com/office/drawing/2014/main" id="{C24704FF-9C2F-CC4F-9FC2-D1C33536B62A}"/>
-              </a:ext>
-            </a:extLst>
-          </p:cNvPr>
-          <p:cNvSpPr/>
-          <p:nvPr/>
-        </p:nvSpPr>
-        <p:spPr>
-          <a:xfrm>
-            <a:off x="6784083" y="3114530"/>
-            <a:ext cx="253435" cy="212902"/>
+            <a:off x="1730133" y="5076484"/>
+            <a:ext cx="356742" cy="291049"/>
           </a:xfrm>
           <a:prstGeom prst="ellipse">
             <a:avLst/>
@@ -4574,10 +5126,428 @@
           </a:p>
         </p:txBody>
       </p:sp>
+      <p:sp>
+        <p:nvSpPr>
+          <p:cNvPr id="29" name="Oval 28">
+            <a:extLst>
+              <a:ext uri="{FF2B5EF4-FFF2-40B4-BE49-F238E27FC236}">
+                <a16:creationId xmlns:a16="http://schemas.microsoft.com/office/drawing/2014/main" id="{2E93EB8A-BF03-7B1A-BC21-CAA698323757}"/>
+              </a:ext>
+            </a:extLst>
+          </p:cNvPr>
+          <p:cNvSpPr/>
+          <p:nvPr/>
+        </p:nvSpPr>
+        <p:spPr>
+          <a:xfrm>
+            <a:off x="5860408" y="1955727"/>
+            <a:ext cx="356742" cy="291049"/>
+          </a:xfrm>
+          <a:prstGeom prst="ellipse">
+            <a:avLst/>
+          </a:prstGeom>
+          <a:solidFill>
+            <a:schemeClr val="tx1"/>
+          </a:solidFill>
+          <a:ln>
+            <a:solidFill>
+              <a:schemeClr val="tx1"/>
+            </a:solidFill>
+          </a:ln>
+        </p:spPr>
+        <p:style>
+          <a:lnRef idx="2">
+            <a:schemeClr val="accent1">
+              <a:shade val="50000"/>
+            </a:schemeClr>
+          </a:lnRef>
+          <a:fillRef idx="1">
+            <a:schemeClr val="accent1"/>
+          </a:fillRef>
+          <a:effectRef idx="0">
+            <a:schemeClr val="accent1"/>
+          </a:effectRef>
+          <a:fontRef idx="minor">
+            <a:schemeClr val="lt1"/>
+          </a:fontRef>
+        </p:style>
+        <p:txBody>
+          <a:bodyPr lIns="0" tIns="0" rIns="0" bIns="0" rtlCol="0" anchor="ctr"/>
+          <a:lstStyle/>
+          <a:p>
+            <a:pPr algn="ctr"/>
+            <a:r>
+              <a:rPr lang="en-US" sz="800" dirty="0">
+                <a:latin typeface="Arial" panose="020B0604020202020204" pitchFamily="34" charset="0"/>
+                <a:cs typeface="Arial" panose="020B0604020202020204" pitchFamily="34" charset="0"/>
+              </a:rPr>
+              <a:t>1.3</a:t>
+            </a:r>
+          </a:p>
+        </p:txBody>
+      </p:sp>
+      <p:sp>
+        <p:nvSpPr>
+          <p:cNvPr id="30" name="Oval 29">
+            <a:extLst>
+              <a:ext uri="{FF2B5EF4-FFF2-40B4-BE49-F238E27FC236}">
+                <a16:creationId xmlns:a16="http://schemas.microsoft.com/office/drawing/2014/main" id="{6789C25E-99B7-D044-6A68-6F9B7A0E560C}"/>
+              </a:ext>
+            </a:extLst>
+          </p:cNvPr>
+          <p:cNvSpPr/>
+          <p:nvPr/>
+        </p:nvSpPr>
+        <p:spPr>
+          <a:xfrm>
+            <a:off x="7859060" y="1955727"/>
+            <a:ext cx="356742" cy="291049"/>
+          </a:xfrm>
+          <a:prstGeom prst="ellipse">
+            <a:avLst/>
+          </a:prstGeom>
+          <a:solidFill>
+            <a:schemeClr val="tx1"/>
+          </a:solidFill>
+          <a:ln>
+            <a:solidFill>
+              <a:schemeClr val="tx1"/>
+            </a:solidFill>
+          </a:ln>
+        </p:spPr>
+        <p:style>
+          <a:lnRef idx="2">
+            <a:schemeClr val="accent1">
+              <a:shade val="50000"/>
+            </a:schemeClr>
+          </a:lnRef>
+          <a:fillRef idx="1">
+            <a:schemeClr val="accent1"/>
+          </a:fillRef>
+          <a:effectRef idx="0">
+            <a:schemeClr val="accent1"/>
+          </a:effectRef>
+          <a:fontRef idx="minor">
+            <a:schemeClr val="lt1"/>
+          </a:fontRef>
+        </p:style>
+        <p:txBody>
+          <a:bodyPr lIns="0" tIns="0" rIns="0" bIns="0" rtlCol="0" anchor="ctr"/>
+          <a:lstStyle/>
+          <a:p>
+            <a:pPr algn="ctr"/>
+            <a:r>
+              <a:rPr lang="en-US" sz="800" dirty="0">
+                <a:latin typeface="Arial" panose="020B0604020202020204" pitchFamily="34" charset="0"/>
+                <a:cs typeface="Arial" panose="020B0604020202020204" pitchFamily="34" charset="0"/>
+              </a:rPr>
+              <a:t>1.5</a:t>
+            </a:r>
+          </a:p>
+        </p:txBody>
+      </p:sp>
+      <p:sp>
+        <p:nvSpPr>
+          <p:cNvPr id="32" name="Oval 31">
+            <a:extLst>
+              <a:ext uri="{FF2B5EF4-FFF2-40B4-BE49-F238E27FC236}">
+                <a16:creationId xmlns:a16="http://schemas.microsoft.com/office/drawing/2014/main" id="{CF82F8B0-D8BA-20D9-A452-6B9F3CF5BBEB}"/>
+              </a:ext>
+            </a:extLst>
+          </p:cNvPr>
+          <p:cNvSpPr/>
+          <p:nvPr/>
+        </p:nvSpPr>
+        <p:spPr>
+          <a:xfrm>
+            <a:off x="5879903" y="3960906"/>
+            <a:ext cx="356742" cy="291049"/>
+          </a:xfrm>
+          <a:prstGeom prst="ellipse">
+            <a:avLst/>
+          </a:prstGeom>
+          <a:solidFill>
+            <a:schemeClr val="tx1"/>
+          </a:solidFill>
+          <a:ln>
+            <a:solidFill>
+              <a:schemeClr val="tx1"/>
+            </a:solidFill>
+          </a:ln>
+        </p:spPr>
+        <p:style>
+          <a:lnRef idx="2">
+            <a:schemeClr val="accent1">
+              <a:shade val="50000"/>
+            </a:schemeClr>
+          </a:lnRef>
+          <a:fillRef idx="1">
+            <a:schemeClr val="accent1"/>
+          </a:fillRef>
+          <a:effectRef idx="0">
+            <a:schemeClr val="accent1"/>
+          </a:effectRef>
+          <a:fontRef idx="minor">
+            <a:schemeClr val="lt1"/>
+          </a:fontRef>
+        </p:style>
+        <p:txBody>
+          <a:bodyPr lIns="0" tIns="0" rIns="0" bIns="0" rtlCol="0" anchor="ctr"/>
+          <a:lstStyle/>
+          <a:p>
+            <a:pPr algn="ctr"/>
+            <a:r>
+              <a:rPr lang="en-US" sz="800" dirty="0">
+                <a:latin typeface="Arial" panose="020B0604020202020204" pitchFamily="34" charset="0"/>
+                <a:cs typeface="Arial" panose="020B0604020202020204" pitchFamily="34" charset="0"/>
+              </a:rPr>
+              <a:t>1.4</a:t>
+            </a:r>
+          </a:p>
+        </p:txBody>
+      </p:sp>
+      <p:sp>
+        <p:nvSpPr>
+          <p:cNvPr id="53" name="TextBox 52">
+            <a:extLst>
+              <a:ext uri="{FF2B5EF4-FFF2-40B4-BE49-F238E27FC236}">
+                <a16:creationId xmlns:a16="http://schemas.microsoft.com/office/drawing/2014/main" id="{9176A24E-7CE9-CD39-6D45-2B7AC1DCB49A}"/>
+              </a:ext>
+            </a:extLst>
+          </p:cNvPr>
+          <p:cNvSpPr txBox="1"/>
+          <p:nvPr/>
+        </p:nvSpPr>
+        <p:spPr>
+          <a:xfrm>
+            <a:off x="3020000" y="5858598"/>
+            <a:ext cx="1428885" cy="276999"/>
+          </a:xfrm>
+          <a:prstGeom prst="rect">
+            <a:avLst/>
+          </a:prstGeom>
+          <a:noFill/>
+        </p:spPr>
+        <p:txBody>
+          <a:bodyPr wrap="square" rtlCol="0">
+            <a:spAutoFit/>
+          </a:bodyPr>
+          <a:lstStyle/>
+          <a:p>
+            <a:pPr algn="ctr"/>
+            <a:r>
+              <a:rPr lang="en-US" sz="1200" dirty="0" err="1">
+                <a:latin typeface="Arial" panose="020B0604020202020204" pitchFamily="34" charset="0"/>
+                <a:cs typeface="Arial" panose="020B0604020202020204" pitchFamily="34" charset="0"/>
+              </a:rPr>
+              <a:t>CodeBuild</a:t>
+            </a:r>
+            <a:r>
+              <a:rPr lang="en-US" sz="1200" dirty="0">
+                <a:latin typeface="Arial" panose="020B0604020202020204" pitchFamily="34" charset="0"/>
+                <a:cs typeface="Arial" panose="020B0604020202020204" pitchFamily="34" charset="0"/>
+              </a:rPr>
+              <a:t> Role</a:t>
+            </a:r>
+          </a:p>
+        </p:txBody>
+      </p:sp>
+      <p:pic>
+        <p:nvPicPr>
+          <p:cNvPr id="54" name="Graphic 53">
+            <a:extLst>
+              <a:ext uri="{FF2B5EF4-FFF2-40B4-BE49-F238E27FC236}">
+                <a16:creationId xmlns:a16="http://schemas.microsoft.com/office/drawing/2014/main" id="{34776372-1F43-9181-EC99-E668CB59B18B}"/>
+              </a:ext>
+            </a:extLst>
+          </p:cNvPr>
+          <p:cNvPicPr>
+            <a:picLocks noChangeAspect="1"/>
+          </p:cNvPicPr>
+          <p:nvPr/>
+        </p:nvPicPr>
+        <p:blipFill>
+          <a:blip r:embed="rId12">
+            <a:extLst>
+              <a:ext uri="{96DAC541-7B7A-43D3-8B79-37D633B846F1}">
+                <asvg:svgBlip xmlns:asvg="http://schemas.microsoft.com/office/drawing/2016/SVG/main" r:embed="rId13"/>
+              </a:ext>
+            </a:extLst>
+          </a:blip>
+          <a:stretch>
+            <a:fillRect/>
+          </a:stretch>
+        </p:blipFill>
+        <p:spPr>
+          <a:xfrm>
+            <a:off x="3354058" y="5087156"/>
+            <a:ext cx="760770" cy="760770"/>
+          </a:xfrm>
+          <a:prstGeom prst="rect">
+            <a:avLst/>
+          </a:prstGeom>
+        </p:spPr>
+      </p:pic>
+      <p:sp>
+        <p:nvSpPr>
+          <p:cNvPr id="55" name="Oval 54">
+            <a:extLst>
+              <a:ext uri="{FF2B5EF4-FFF2-40B4-BE49-F238E27FC236}">
+                <a16:creationId xmlns:a16="http://schemas.microsoft.com/office/drawing/2014/main" id="{AB279368-44A2-73E1-C616-E5149D5B2804}"/>
+              </a:ext>
+            </a:extLst>
+          </p:cNvPr>
+          <p:cNvSpPr/>
+          <p:nvPr/>
+        </p:nvSpPr>
+        <p:spPr>
+          <a:xfrm>
+            <a:off x="3175420" y="5076484"/>
+            <a:ext cx="356742" cy="291049"/>
+          </a:xfrm>
+          <a:prstGeom prst="ellipse">
+            <a:avLst/>
+          </a:prstGeom>
+          <a:solidFill>
+            <a:schemeClr val="tx1"/>
+          </a:solidFill>
+          <a:ln>
+            <a:solidFill>
+              <a:schemeClr val="tx1"/>
+            </a:solidFill>
+          </a:ln>
+        </p:spPr>
+        <p:style>
+          <a:lnRef idx="2">
+            <a:schemeClr val="accent1">
+              <a:shade val="50000"/>
+            </a:schemeClr>
+          </a:lnRef>
+          <a:fillRef idx="1">
+            <a:schemeClr val="accent1"/>
+          </a:fillRef>
+          <a:effectRef idx="0">
+            <a:schemeClr val="accent1"/>
+          </a:effectRef>
+          <a:fontRef idx="minor">
+            <a:schemeClr val="lt1"/>
+          </a:fontRef>
+        </p:style>
+        <p:txBody>
+          <a:bodyPr lIns="0" tIns="0" rIns="0" bIns="0" rtlCol="0" anchor="ctr"/>
+          <a:lstStyle/>
+          <a:p>
+            <a:pPr algn="ctr"/>
+            <a:r>
+              <a:rPr lang="en-US" sz="800" dirty="0">
+                <a:latin typeface="Arial" panose="020B0604020202020204" pitchFamily="34" charset="0"/>
+                <a:cs typeface="Arial" panose="020B0604020202020204" pitchFamily="34" charset="0"/>
+              </a:rPr>
+              <a:t>1.6</a:t>
+            </a:r>
+          </a:p>
+        </p:txBody>
+      </p:sp>
+      <p:pic>
+        <p:nvPicPr>
+          <p:cNvPr id="61" name="Graphic 60" descr="Stack resource icon for the AWS CloudFormation service.">
+            <a:extLst>
+              <a:ext uri="{FF2B5EF4-FFF2-40B4-BE49-F238E27FC236}">
+                <a16:creationId xmlns:a16="http://schemas.microsoft.com/office/drawing/2014/main" id="{2F060231-8714-7ECA-583D-DD3E7684B122}"/>
+              </a:ext>
+            </a:extLst>
+          </p:cNvPr>
+          <p:cNvPicPr>
+            <a:picLocks noChangeAspect="1"/>
+          </p:cNvPicPr>
+          <p:nvPr/>
+        </p:nvPicPr>
+        <p:blipFill>
+          <a:blip r:embed="rId16">
+            <a:extLst>
+              <a:ext uri="{96DAC541-7B7A-43D3-8B79-37D633B846F1}">
+                <asvg:svgBlip xmlns:asvg="http://schemas.microsoft.com/office/drawing/2016/SVG/main" r:embed="rId17"/>
+              </a:ext>
+            </a:extLst>
+          </a:blip>
+          <a:stretch>
+            <a:fillRect/>
+          </a:stretch>
+        </p:blipFill>
+        <p:spPr>
+          <a:xfrm>
+            <a:off x="1906238" y="3418482"/>
+            <a:ext cx="760769" cy="760769"/>
+          </a:xfrm>
+          <a:prstGeom prst="rect">
+            <a:avLst/>
+          </a:prstGeom>
+        </p:spPr>
+      </p:pic>
+      <p:sp>
+        <p:nvSpPr>
+          <p:cNvPr id="27" name="Oval 26">
+            <a:extLst>
+              <a:ext uri="{FF2B5EF4-FFF2-40B4-BE49-F238E27FC236}">
+                <a16:creationId xmlns:a16="http://schemas.microsoft.com/office/drawing/2014/main" id="{02AC2346-5D6E-6FCE-0FA8-17F3A2D1A08F}"/>
+              </a:ext>
+            </a:extLst>
+          </p:cNvPr>
+          <p:cNvSpPr/>
+          <p:nvPr/>
+        </p:nvSpPr>
+        <p:spPr>
+          <a:xfrm>
+            <a:off x="1749889" y="3265942"/>
+            <a:ext cx="356742" cy="291049"/>
+          </a:xfrm>
+          <a:prstGeom prst="ellipse">
+            <a:avLst/>
+          </a:prstGeom>
+          <a:solidFill>
+            <a:schemeClr val="tx1"/>
+          </a:solidFill>
+          <a:ln>
+            <a:solidFill>
+              <a:schemeClr val="tx1"/>
+            </a:solidFill>
+          </a:ln>
+        </p:spPr>
+        <p:style>
+          <a:lnRef idx="2">
+            <a:schemeClr val="accent1">
+              <a:shade val="50000"/>
+            </a:schemeClr>
+          </a:lnRef>
+          <a:fillRef idx="1">
+            <a:schemeClr val="accent1"/>
+          </a:fillRef>
+          <a:effectRef idx="0">
+            <a:schemeClr val="accent1"/>
+          </a:effectRef>
+          <a:fontRef idx="minor">
+            <a:schemeClr val="lt1"/>
+          </a:fontRef>
+        </p:style>
+        <p:txBody>
+          <a:bodyPr lIns="0" tIns="0" rIns="0" bIns="0" rtlCol="0" anchor="ctr"/>
+          <a:lstStyle/>
+          <a:p>
+            <a:pPr algn="ctr"/>
+            <a:r>
+              <a:rPr lang="en-US" sz="800" dirty="0">
+                <a:latin typeface="Arial" panose="020B0604020202020204" pitchFamily="34" charset="0"/>
+                <a:cs typeface="Arial" panose="020B0604020202020204" pitchFamily="34" charset="0"/>
+              </a:rPr>
+              <a:t>1.7</a:t>
+            </a:r>
+          </a:p>
+        </p:txBody>
+      </p:sp>
     </p:spTree>
     <p:extLst>
       <p:ext uri="{BB962C8B-B14F-4D97-AF65-F5344CB8AC3E}">
-        <p14:creationId xmlns:p14="http://schemas.microsoft.com/office/powerpoint/2010/main" val="680312038"/>
+        <p14:creationId xmlns:p14="http://schemas.microsoft.com/office/powerpoint/2010/main" val="1848008119"/>
       </p:ext>
     </p:extLst>
   </p:cSld>

</xml_diff>

<commit_message>
adding codebuild project to download latest cfct template (#197)
Co-authored-by: ievgeniia ieromenko <ieviero@amazon.com>
</commit_message>
<xml_diff>
--- a/aws_sra_examples/solutions/common/common_cfct_setup/documentation/common-cfct-setup.pptx
+++ b/aws_sra_examples/solutions/common/common_cfct_setup/documentation/common-cfct-setup.pptx
@@ -8,7 +8,7 @@
     <p:notesMasterId r:id="rId3"/>
   </p:notesMasterIdLst>
   <p:sldIdLst>
-    <p:sldId id="257" r:id="rId2"/>
+    <p:sldId id="260" r:id="rId2"/>
   </p:sldIdLst>
   <p:sldSz cx="12192000" cy="6858000"/>
   <p:notesSz cx="6858000" cy="9144000"/>
@@ -109,7 +109,18 @@
   </p:defaultTextStyle>
   <p:extLst>
     <p:ext uri="{EFAFB233-063F-42B5-8137-9DF3F51BA10A}">
-      <p15:sldGuideLst xmlns:p15="http://schemas.microsoft.com/office/powerpoint/2012/main"/>
+      <p15:sldGuideLst xmlns:p15="http://schemas.microsoft.com/office/powerpoint/2012/main">
+        <p15:guide id="1" pos="3840" userDrawn="1">
+          <p15:clr>
+            <a:srgbClr val="A4A3A4"/>
+          </p15:clr>
+        </p15:guide>
+        <p15:guide id="2" orient="horz" pos="2160" userDrawn="1">
+          <p15:clr>
+            <a:srgbClr val="A4A3A4"/>
+          </p15:clr>
+        </p15:guide>
+      </p15:sldGuideLst>
     </p:ext>
   </p:extLst>
 </p:presentation>
@@ -197,7 +208,7 @@
           <a:p>
             <a:fld id="{FD8D84E3-00BA-4A46-8256-7E527D8B4480}" type="datetimeFigureOut">
               <a:rPr lang="en-US" smtClean="0"/>
-              <a:t>3/6/22</a:t>
+              <a:t>11/21/23</a:t>
             </a:fld>
             <a:endParaRPr lang="en-US"/>
           </a:p>
@@ -538,7 +549,7 @@
     </p:spTree>
     <p:extLst>
       <p:ext uri="{BB962C8B-B14F-4D97-AF65-F5344CB8AC3E}">
-        <p14:creationId xmlns:p14="http://schemas.microsoft.com/office/powerpoint/2010/main" val="304048535"/>
+        <p14:creationId xmlns:p14="http://schemas.microsoft.com/office/powerpoint/2010/main" val="2701646952"/>
       </p:ext>
     </p:extLst>
   </p:cSld>
@@ -695,7 +706,7 @@
           <a:p>
             <a:fld id="{9FE185F7-9B28-9F45-9F43-9CB5A0B99390}" type="datetimeFigureOut">
               <a:rPr lang="en-US" smtClean="0"/>
-              <a:t>3/6/22</a:t>
+              <a:t>11/21/23</a:t>
             </a:fld>
             <a:endParaRPr lang="en-US"/>
           </a:p>
@@ -893,7 +904,7 @@
           <a:p>
             <a:fld id="{9FE185F7-9B28-9F45-9F43-9CB5A0B99390}" type="datetimeFigureOut">
               <a:rPr lang="en-US" smtClean="0"/>
-              <a:t>3/6/22</a:t>
+              <a:t>11/21/23</a:t>
             </a:fld>
             <a:endParaRPr lang="en-US"/>
           </a:p>
@@ -1101,7 +1112,7 @@
           <a:p>
             <a:fld id="{9FE185F7-9B28-9F45-9F43-9CB5A0B99390}" type="datetimeFigureOut">
               <a:rPr lang="en-US" smtClean="0"/>
-              <a:t>3/6/22</a:t>
+              <a:t>11/21/23</a:t>
             </a:fld>
             <a:endParaRPr lang="en-US"/>
           </a:p>
@@ -1299,7 +1310,7 @@
           <a:p>
             <a:fld id="{9FE185F7-9B28-9F45-9F43-9CB5A0B99390}" type="datetimeFigureOut">
               <a:rPr lang="en-US" smtClean="0"/>
-              <a:t>3/6/22</a:t>
+              <a:t>11/21/23</a:t>
             </a:fld>
             <a:endParaRPr lang="en-US"/>
           </a:p>
@@ -1574,7 +1585,7 @@
           <a:p>
             <a:fld id="{9FE185F7-9B28-9F45-9F43-9CB5A0B99390}" type="datetimeFigureOut">
               <a:rPr lang="en-US" smtClean="0"/>
-              <a:t>3/6/22</a:t>
+              <a:t>11/21/23</a:t>
             </a:fld>
             <a:endParaRPr lang="en-US"/>
           </a:p>
@@ -1839,7 +1850,7 @@
           <a:p>
             <a:fld id="{9FE185F7-9B28-9F45-9F43-9CB5A0B99390}" type="datetimeFigureOut">
               <a:rPr lang="en-US" smtClean="0"/>
-              <a:t>3/6/22</a:t>
+              <a:t>11/21/23</a:t>
             </a:fld>
             <a:endParaRPr lang="en-US"/>
           </a:p>
@@ -2251,7 +2262,7 @@
           <a:p>
             <a:fld id="{9FE185F7-9B28-9F45-9F43-9CB5A0B99390}" type="datetimeFigureOut">
               <a:rPr lang="en-US" smtClean="0"/>
-              <a:t>3/6/22</a:t>
+              <a:t>11/21/23</a:t>
             </a:fld>
             <a:endParaRPr lang="en-US"/>
           </a:p>
@@ -2392,7 +2403,7 @@
           <a:p>
             <a:fld id="{9FE185F7-9B28-9F45-9F43-9CB5A0B99390}" type="datetimeFigureOut">
               <a:rPr lang="en-US" smtClean="0"/>
-              <a:t>3/6/22</a:t>
+              <a:t>11/21/23</a:t>
             </a:fld>
             <a:endParaRPr lang="en-US"/>
           </a:p>
@@ -2505,7 +2516,7 @@
           <a:p>
             <a:fld id="{9FE185F7-9B28-9F45-9F43-9CB5A0B99390}" type="datetimeFigureOut">
               <a:rPr lang="en-US" smtClean="0"/>
-              <a:t>3/6/22</a:t>
+              <a:t>11/21/23</a:t>
             </a:fld>
             <a:endParaRPr lang="en-US"/>
           </a:p>
@@ -2816,7 +2827,7 @@
           <a:p>
             <a:fld id="{9FE185F7-9B28-9F45-9F43-9CB5A0B99390}" type="datetimeFigureOut">
               <a:rPr lang="en-US" smtClean="0"/>
-              <a:t>3/6/22</a:t>
+              <a:t>11/21/23</a:t>
             </a:fld>
             <a:endParaRPr lang="en-US"/>
           </a:p>
@@ -3104,7 +3115,7 @@
           <a:p>
             <a:fld id="{9FE185F7-9B28-9F45-9F43-9CB5A0B99390}" type="datetimeFigureOut">
               <a:rPr lang="en-US" smtClean="0"/>
-              <a:t>3/6/22</a:t>
+              <a:t>11/21/23</a:t>
             </a:fld>
             <a:endParaRPr lang="en-US"/>
           </a:p>
@@ -3345,7 +3356,7 @@
           <a:p>
             <a:fld id="{9FE185F7-9B28-9F45-9F43-9CB5A0B99390}" type="datetimeFigureOut">
               <a:rPr lang="en-US" smtClean="0"/>
-              <a:t>3/6/22</a:t>
+              <a:t>11/21/23</a:t>
             </a:fld>
             <a:endParaRPr lang="en-US"/>
           </a:p>
@@ -3764,10 +3775,10 @@
       </p:grpSpPr>
       <p:sp>
         <p:nvSpPr>
-          <p:cNvPr id="27" name="Rectangle 26">
-            <a:extLst>
-              <a:ext uri="{FF2B5EF4-FFF2-40B4-BE49-F238E27FC236}">
-                <a16:creationId xmlns:a16="http://schemas.microsoft.com/office/drawing/2014/main" id="{0D1E596F-94A8-4843-9078-9508FDE2D2FD}"/>
+          <p:cNvPr id="81" name="Rectangle 80">
+            <a:extLst>
+              <a:ext uri="{FF2B5EF4-FFF2-40B4-BE49-F238E27FC236}">
+                <a16:creationId xmlns:a16="http://schemas.microsoft.com/office/drawing/2014/main" id="{FD0BEA75-341F-49B4-83DB-758CA12480EF}"/>
               </a:ext>
             </a:extLst>
           </p:cNvPr>
@@ -3776,15 +3787,13 @@
         </p:nvSpPr>
         <p:spPr>
           <a:xfrm>
-            <a:off x="4258722" y="1597382"/>
-            <a:ext cx="4058428" cy="3052439"/>
+            <a:off x="503605" y="158632"/>
+            <a:ext cx="10985663" cy="6540737"/>
           </a:xfrm>
           <a:prstGeom prst="rect">
             <a:avLst/>
           </a:prstGeom>
-          <a:solidFill>
-            <a:schemeClr val="bg1"/>
-          </a:solidFill>
+          <a:noFill/>
           <a:ln w="12700">
             <a:solidFill>
               <a:schemeClr val="tx1"/>
@@ -3808,108 +3817,20 @@
           </a:fontRef>
         </p:style>
         <p:txBody>
-          <a:bodyPr rot="0" spcFirstLastPara="0" vert="horz" wrap="square" lIns="457200" tIns="91440" rIns="91440" bIns="45720" numCol="1" spcCol="0" rtlCol="0" fromWordArt="0" anchor="t" anchorCtr="0" forceAA="0" compatLnSpc="1">
-            <a:prstTxWarp prst="textNoShape">
-              <a:avLst/>
-            </a:prstTxWarp>
-            <a:noAutofit/>
-          </a:bodyPr>
-          <a:lstStyle>
-            <a:lvl1pPr>
-              <a:defRPr>
-                <a:solidFill>
-                  <a:schemeClr val="lt1"/>
-                </a:solidFill>
-                <a:latin typeface="+mn-lt"/>
-                <a:ea typeface="+mn-ea"/>
-                <a:cs typeface="+mn-cs"/>
-              </a:defRPr>
-            </a:lvl1pPr>
-            <a:lvl2pPr>
-              <a:defRPr>
-                <a:solidFill>
-                  <a:schemeClr val="lt1"/>
-                </a:solidFill>
-                <a:latin typeface="+mn-lt"/>
-                <a:ea typeface="+mn-ea"/>
-                <a:cs typeface="+mn-cs"/>
-              </a:defRPr>
-            </a:lvl2pPr>
-            <a:lvl3pPr>
-              <a:defRPr>
-                <a:solidFill>
-                  <a:schemeClr val="lt1"/>
-                </a:solidFill>
-                <a:latin typeface="+mn-lt"/>
-                <a:ea typeface="+mn-ea"/>
-                <a:cs typeface="+mn-cs"/>
-              </a:defRPr>
-            </a:lvl3pPr>
-            <a:lvl4pPr>
-              <a:defRPr>
-                <a:solidFill>
-                  <a:schemeClr val="lt1"/>
-                </a:solidFill>
-                <a:latin typeface="+mn-lt"/>
-                <a:ea typeface="+mn-ea"/>
-                <a:cs typeface="+mn-cs"/>
-              </a:defRPr>
-            </a:lvl4pPr>
-            <a:lvl5pPr>
-              <a:defRPr>
-                <a:solidFill>
-                  <a:schemeClr val="lt1"/>
-                </a:solidFill>
-                <a:latin typeface="+mn-lt"/>
-                <a:ea typeface="+mn-ea"/>
-                <a:cs typeface="+mn-cs"/>
-              </a:defRPr>
-            </a:lvl5pPr>
-            <a:lvl6pPr>
-              <a:defRPr>
-                <a:solidFill>
-                  <a:schemeClr val="lt1"/>
-                </a:solidFill>
-                <a:latin typeface="+mn-lt"/>
-                <a:ea typeface="+mn-ea"/>
-                <a:cs typeface="+mn-cs"/>
-              </a:defRPr>
-            </a:lvl6pPr>
-            <a:lvl7pPr>
-              <a:defRPr>
-                <a:solidFill>
-                  <a:schemeClr val="lt1"/>
-                </a:solidFill>
-                <a:latin typeface="+mn-lt"/>
-                <a:ea typeface="+mn-ea"/>
-                <a:cs typeface="+mn-cs"/>
-              </a:defRPr>
-            </a:lvl7pPr>
-            <a:lvl8pPr>
-              <a:defRPr>
-                <a:solidFill>
-                  <a:schemeClr val="lt1"/>
-                </a:solidFill>
-                <a:latin typeface="+mn-lt"/>
-                <a:ea typeface="+mn-ea"/>
-                <a:cs typeface="+mn-cs"/>
-              </a:defRPr>
-            </a:lvl8pPr>
-            <a:lvl9pPr>
-              <a:defRPr>
-                <a:solidFill>
-                  <a:schemeClr val="lt1"/>
-                </a:solidFill>
-                <a:latin typeface="+mn-lt"/>
-                <a:ea typeface="+mn-ea"/>
-                <a:cs typeface="+mn-cs"/>
-              </a:defRPr>
-            </a:lvl9pPr>
-          </a:lstStyle>
-          <a:p>
-            <a:pPr algn="l"/>
-            <a:r>
-              <a:rPr lang="en-US" sz="1400" dirty="0">
+          <a:bodyPr lIns="502920" tIns="91440"/>
+          <a:lstStyle/>
+          <a:p>
+            <a:pPr eaLnBrk="1" fontAlgn="auto" hangingPunct="1">
+              <a:spcBef>
+                <a:spcPts val="0"/>
+              </a:spcBef>
+              <a:spcAft>
+                <a:spcPts val="0"/>
+              </a:spcAft>
+              <a:defRPr/>
+            </a:pPr>
+            <a:r>
+              <a:rPr lang="en-US" sz="1200" dirty="0">
                 <a:solidFill>
                   <a:sysClr val="windowText" lastClr="000000"/>
                 </a:solidFill>
@@ -3923,10 +3844,10 @@
       </p:sp>
       <p:pic>
         <p:nvPicPr>
-          <p:cNvPr id="126" name="Graphic 2">
-            <a:extLst>
-              <a:ext uri="{FF2B5EF4-FFF2-40B4-BE49-F238E27FC236}">
-                <a16:creationId xmlns:a16="http://schemas.microsoft.com/office/drawing/2014/main" id="{F04267D0-7955-2C4A-842B-D8A3A9599CC0}"/>
+          <p:cNvPr id="82" name="Graphic 81">
+            <a:extLst>
+              <a:ext uri="{FF2B5EF4-FFF2-40B4-BE49-F238E27FC236}">
+                <a16:creationId xmlns:a16="http://schemas.microsoft.com/office/drawing/2014/main" id="{ADF00096-D97F-4D69-B4CB-8B0D7A8DF2BF}"/>
               </a:ext>
             </a:extLst>
           </p:cNvPr>
@@ -3943,14 +3864,13 @@
               </a:ext>
             </a:extLst>
           </a:blip>
-          <a:stretch>
-            <a:fillRect/>
-          </a:stretch>
+          <a:srcRect/>
+          <a:stretch/>
         </p:blipFill>
         <p:spPr>
           <a:xfrm>
-            <a:off x="4258722" y="1597382"/>
-            <a:ext cx="330200" cy="330200"/>
+            <a:off x="503605" y="158631"/>
+            <a:ext cx="381000" cy="381000"/>
           </a:xfrm>
           <a:prstGeom prst="rect">
             <a:avLst/>
@@ -3959,10 +3879,10 @@
       </p:pic>
       <p:sp>
         <p:nvSpPr>
-          <p:cNvPr id="129" name="Rectangle 128">
-            <a:extLst>
-              <a:ext uri="{FF2B5EF4-FFF2-40B4-BE49-F238E27FC236}">
-                <a16:creationId xmlns:a16="http://schemas.microsoft.com/office/drawing/2014/main" id="{FB73AA4D-BE37-B546-8168-72555838077A}"/>
+          <p:cNvPr id="87" name="Rectangle 86">
+            <a:extLst>
+              <a:ext uri="{FF2B5EF4-FFF2-40B4-BE49-F238E27FC236}">
+                <a16:creationId xmlns:a16="http://schemas.microsoft.com/office/drawing/2014/main" id="{233194F9-79FD-453D-AC8F-FA9F8DEF9795}"/>
               </a:ext>
             </a:extLst>
           </p:cNvPr>
@@ -3971,8 +3891,8 @@
         </p:nvSpPr>
         <p:spPr>
           <a:xfrm>
-            <a:off x="4388803" y="2009655"/>
-            <a:ext cx="3811615" cy="2503979"/>
+            <a:off x="667130" y="590707"/>
+            <a:ext cx="10492127" cy="5886293"/>
           </a:xfrm>
           <a:prstGeom prst="rect">
             <a:avLst/>
@@ -3980,9 +3900,8 @@
           <a:noFill/>
           <a:ln w="12700">
             <a:solidFill>
-              <a:schemeClr val="tx1"/>
+              <a:srgbClr val="CD2264"/>
             </a:solidFill>
-            <a:prstDash val="solid"/>
           </a:ln>
         </p:spPr>
         <p:style>
@@ -4002,73 +3921,37 @@
           </a:fontRef>
         </p:style>
         <p:txBody>
-          <a:bodyPr rot="0" spcFirstLastPara="0" vertOverflow="overflow" horzOverflow="overflow" vert="horz" wrap="square" lIns="91440" tIns="91440" rIns="91440" bIns="45720" numCol="1" spcCol="0" rtlCol="0" fromWordArt="0" anchor="t" anchorCtr="0" forceAA="0" compatLnSpc="1">
-            <a:prstTxWarp prst="textNoShape">
-              <a:avLst/>
-            </a:prstTxWarp>
-            <a:noAutofit/>
-          </a:bodyPr>
-          <a:lstStyle/>
-          <a:p>
-            <a:pPr algn="ctr"/>
-            <a:r>
-              <a:rPr lang="en-US" sz="1400" dirty="0">
+          <a:bodyPr lIns="502920" tIns="91440"/>
+          <a:lstStyle/>
+          <a:p>
+            <a:pPr eaLnBrk="1" fontAlgn="auto" hangingPunct="1">
+              <a:spcBef>
+                <a:spcPts val="0"/>
+              </a:spcBef>
+              <a:spcAft>
+                <a:spcPts val="0"/>
+              </a:spcAft>
+              <a:defRPr/>
+            </a:pPr>
+            <a:r>
+              <a:rPr lang="en-US" sz="1200" dirty="0">
                 <a:solidFill>
-                  <a:schemeClr val="tx1"/>
+                  <a:srgbClr val="CD2264"/>
                 </a:solidFill>
                 <a:latin typeface="Arial" panose="020B0604020202020204" pitchFamily="34" charset="0"/>
                 <a:cs typeface="Arial" panose="020B0604020202020204" pitchFamily="34" charset="0"/>
               </a:rPr>
-              <a:t>Organization Management Account</a:t>
-            </a:r>
-          </a:p>
-        </p:txBody>
-      </p:sp>
-      <p:sp>
-        <p:nvSpPr>
-          <p:cNvPr id="151" name="TextBox 150">
-            <a:extLst>
-              <a:ext uri="{FF2B5EF4-FFF2-40B4-BE49-F238E27FC236}">
-                <a16:creationId xmlns:a16="http://schemas.microsoft.com/office/drawing/2014/main" id="{08B67E83-7D09-C748-AEEF-49786315014A}"/>
-              </a:ext>
-            </a:extLst>
-          </p:cNvPr>
-          <p:cNvSpPr txBox="1"/>
-          <p:nvPr/>
-        </p:nvSpPr>
-        <p:spPr>
-          <a:xfrm>
-            <a:off x="4767497" y="3530414"/>
-            <a:ext cx="1307240" cy="430887"/>
-          </a:xfrm>
-          <a:prstGeom prst="rect">
-            <a:avLst/>
-          </a:prstGeom>
-          <a:noFill/>
-        </p:spPr>
-        <p:txBody>
-          <a:bodyPr wrap="square" rtlCol="0">
-            <a:spAutoFit/>
-          </a:bodyPr>
-          <a:lstStyle/>
-          <a:p>
-            <a:pPr algn="ctr"/>
-            <a:r>
-              <a:rPr lang="en-US" sz="1100" dirty="0">
-                <a:latin typeface="Arial" panose="020B0604020202020204" pitchFamily="34" charset="0"/>
-                <a:cs typeface="Arial" panose="020B0604020202020204" pitchFamily="34" charset="0"/>
-              </a:rPr>
-              <a:t>AWS CloudFormation</a:t>
+              <a:t>     Organization Management Account</a:t>
             </a:r>
           </a:p>
         </p:txBody>
       </p:sp>
       <p:pic>
         <p:nvPicPr>
-          <p:cNvPr id="152" name="Graphic 151">
-            <a:extLst>
-              <a:ext uri="{FF2B5EF4-FFF2-40B4-BE49-F238E27FC236}">
-                <a16:creationId xmlns:a16="http://schemas.microsoft.com/office/drawing/2014/main" id="{399FFB55-9DC7-0642-93ED-51225281247C}"/>
+          <p:cNvPr id="88" name="Graphic 87">
+            <a:extLst>
+              <a:ext uri="{FF2B5EF4-FFF2-40B4-BE49-F238E27FC236}">
+                <a16:creationId xmlns:a16="http://schemas.microsoft.com/office/drawing/2014/main" id="{234AB67D-9201-40E8-83E1-AF224AFD12B8}"/>
               </a:ext>
             </a:extLst>
           </p:cNvPr>
@@ -4091,8 +3974,8 @@
         </p:blipFill>
         <p:spPr>
           <a:xfrm>
-            <a:off x="5192517" y="3073214"/>
-            <a:ext cx="457200" cy="457200"/>
+            <a:off x="664112" y="590706"/>
+            <a:ext cx="537059" cy="537059"/>
           </a:xfrm>
           <a:prstGeom prst="rect">
             <a:avLst/>
@@ -4101,10 +3984,459 @@
       </p:pic>
       <p:sp>
         <p:nvSpPr>
-          <p:cNvPr id="226" name="Oval 225">
-            <a:extLst>
-              <a:ext uri="{FF2B5EF4-FFF2-40B4-BE49-F238E27FC236}">
-                <a16:creationId xmlns:a16="http://schemas.microsoft.com/office/drawing/2014/main" id="{B075B0CF-8F6A-3947-BD02-50EB6DA85CEE}"/>
+          <p:cNvPr id="122" name="TextBox 2">
+            <a:extLst>
+              <a:ext uri="{FF2B5EF4-FFF2-40B4-BE49-F238E27FC236}">
+                <a16:creationId xmlns:a16="http://schemas.microsoft.com/office/drawing/2014/main" id="{D779FD12-DEC5-45B4-89B4-2B5EBBA6290B}"/>
+              </a:ext>
+            </a:extLst>
+          </p:cNvPr>
+          <p:cNvSpPr txBox="1"/>
+          <p:nvPr/>
+        </p:nvSpPr>
+        <p:spPr>
+          <a:xfrm>
+            <a:off x="5716417" y="2910666"/>
+            <a:ext cx="1454645" cy="276999"/>
+          </a:xfrm>
+          <a:prstGeom prst="rect">
+            <a:avLst/>
+          </a:prstGeom>
+          <a:noFill/>
+        </p:spPr>
+        <p:style>
+          <a:lnRef idx="0">
+            <a:scrgbClr r="0" g="0" b="0"/>
+          </a:lnRef>
+          <a:fillRef idx="0">
+            <a:scrgbClr r="0" g="0" b="0"/>
+          </a:fillRef>
+          <a:effectRef idx="0">
+            <a:scrgbClr r="0" g="0" b="0"/>
+          </a:effectRef>
+          <a:fontRef idx="major"/>
+        </p:style>
+        <p:txBody>
+          <a:bodyPr wrap="square" rtlCol="0">
+            <a:spAutoFit/>
+          </a:bodyPr>
+          <a:lstStyle>
+            <a:lvl1pPr>
+              <a:defRPr>
+                <a:latin typeface="+mj-lt"/>
+                <a:ea typeface="+mj-ea"/>
+                <a:cs typeface="+mj-cs"/>
+              </a:defRPr>
+            </a:lvl1pPr>
+            <a:lvl2pPr>
+              <a:defRPr>
+                <a:latin typeface="+mj-lt"/>
+                <a:ea typeface="+mj-ea"/>
+                <a:cs typeface="+mj-cs"/>
+              </a:defRPr>
+            </a:lvl2pPr>
+            <a:lvl3pPr>
+              <a:defRPr>
+                <a:latin typeface="+mj-lt"/>
+                <a:ea typeface="+mj-ea"/>
+                <a:cs typeface="+mj-cs"/>
+              </a:defRPr>
+            </a:lvl3pPr>
+            <a:lvl4pPr>
+              <a:defRPr>
+                <a:latin typeface="+mj-lt"/>
+                <a:ea typeface="+mj-ea"/>
+                <a:cs typeface="+mj-cs"/>
+              </a:defRPr>
+            </a:lvl4pPr>
+            <a:lvl5pPr>
+              <a:defRPr>
+                <a:latin typeface="+mj-lt"/>
+                <a:ea typeface="+mj-ea"/>
+                <a:cs typeface="+mj-cs"/>
+              </a:defRPr>
+            </a:lvl5pPr>
+            <a:lvl6pPr>
+              <a:defRPr>
+                <a:latin typeface="+mj-lt"/>
+                <a:ea typeface="+mj-ea"/>
+                <a:cs typeface="+mj-cs"/>
+              </a:defRPr>
+            </a:lvl6pPr>
+            <a:lvl7pPr>
+              <a:defRPr>
+                <a:latin typeface="+mj-lt"/>
+                <a:ea typeface="+mj-ea"/>
+                <a:cs typeface="+mj-cs"/>
+              </a:defRPr>
+            </a:lvl7pPr>
+            <a:lvl8pPr>
+              <a:defRPr>
+                <a:latin typeface="+mj-lt"/>
+                <a:ea typeface="+mj-ea"/>
+                <a:cs typeface="+mj-cs"/>
+              </a:defRPr>
+            </a:lvl8pPr>
+            <a:lvl9pPr>
+              <a:defRPr>
+                <a:latin typeface="+mj-lt"/>
+                <a:ea typeface="+mj-ea"/>
+                <a:cs typeface="+mj-cs"/>
+              </a:defRPr>
+            </a:lvl9pPr>
+          </a:lstStyle>
+          <a:p>
+            <a:pPr algn="ctr"/>
+            <a:r>
+              <a:rPr lang="en-US" sz="1200" dirty="0">
+                <a:latin typeface="Arial" panose="020B0604020202020204" pitchFamily="34" charset="0"/>
+                <a:cs typeface="Arial" panose="020B0604020202020204" pitchFamily="34" charset="0"/>
+              </a:rPr>
+              <a:t>Lambda Function</a:t>
+            </a:r>
+          </a:p>
+        </p:txBody>
+      </p:sp>
+      <p:sp>
+        <p:nvSpPr>
+          <p:cNvPr id="123" name="TextBox 2">
+            <a:extLst>
+              <a:ext uri="{FF2B5EF4-FFF2-40B4-BE49-F238E27FC236}">
+                <a16:creationId xmlns:a16="http://schemas.microsoft.com/office/drawing/2014/main" id="{956DC4A8-C454-4D0C-A193-B9CF227389CD}"/>
+              </a:ext>
+            </a:extLst>
+          </p:cNvPr>
+          <p:cNvSpPr txBox="1"/>
+          <p:nvPr/>
+        </p:nvSpPr>
+        <p:spPr>
+          <a:xfrm>
+            <a:off x="5889297" y="4800747"/>
+            <a:ext cx="1098724" cy="461665"/>
+          </a:xfrm>
+          <a:prstGeom prst="rect">
+            <a:avLst/>
+          </a:prstGeom>
+          <a:noFill/>
+        </p:spPr>
+        <p:style>
+          <a:lnRef idx="0">
+            <a:scrgbClr r="0" g="0" b="0"/>
+          </a:lnRef>
+          <a:fillRef idx="0">
+            <a:scrgbClr r="0" g="0" b="0"/>
+          </a:fillRef>
+          <a:effectRef idx="0">
+            <a:scrgbClr r="0" g="0" b="0"/>
+          </a:effectRef>
+          <a:fontRef idx="major"/>
+        </p:style>
+        <p:txBody>
+          <a:bodyPr wrap="square" rtlCol="0">
+            <a:spAutoFit/>
+          </a:bodyPr>
+          <a:lstStyle>
+            <a:lvl1pPr>
+              <a:defRPr>
+                <a:latin typeface="+mj-lt"/>
+                <a:ea typeface="+mj-ea"/>
+                <a:cs typeface="+mj-cs"/>
+              </a:defRPr>
+            </a:lvl1pPr>
+            <a:lvl2pPr>
+              <a:defRPr>
+                <a:latin typeface="+mj-lt"/>
+                <a:ea typeface="+mj-ea"/>
+                <a:cs typeface="+mj-cs"/>
+              </a:defRPr>
+            </a:lvl2pPr>
+            <a:lvl3pPr>
+              <a:defRPr>
+                <a:latin typeface="+mj-lt"/>
+                <a:ea typeface="+mj-ea"/>
+                <a:cs typeface="+mj-cs"/>
+              </a:defRPr>
+            </a:lvl3pPr>
+            <a:lvl4pPr>
+              <a:defRPr>
+                <a:latin typeface="+mj-lt"/>
+                <a:ea typeface="+mj-ea"/>
+                <a:cs typeface="+mj-cs"/>
+              </a:defRPr>
+            </a:lvl4pPr>
+            <a:lvl5pPr>
+              <a:defRPr>
+                <a:latin typeface="+mj-lt"/>
+                <a:ea typeface="+mj-ea"/>
+                <a:cs typeface="+mj-cs"/>
+              </a:defRPr>
+            </a:lvl5pPr>
+            <a:lvl6pPr>
+              <a:defRPr>
+                <a:latin typeface="+mj-lt"/>
+                <a:ea typeface="+mj-ea"/>
+                <a:cs typeface="+mj-cs"/>
+              </a:defRPr>
+            </a:lvl6pPr>
+            <a:lvl7pPr>
+              <a:defRPr>
+                <a:latin typeface="+mj-lt"/>
+                <a:ea typeface="+mj-ea"/>
+                <a:cs typeface="+mj-cs"/>
+              </a:defRPr>
+            </a:lvl7pPr>
+            <a:lvl8pPr>
+              <a:defRPr>
+                <a:latin typeface="+mj-lt"/>
+                <a:ea typeface="+mj-ea"/>
+                <a:cs typeface="+mj-cs"/>
+              </a:defRPr>
+            </a:lvl8pPr>
+            <a:lvl9pPr>
+              <a:defRPr>
+                <a:latin typeface="+mj-lt"/>
+                <a:ea typeface="+mj-ea"/>
+                <a:cs typeface="+mj-cs"/>
+              </a:defRPr>
+            </a:lvl9pPr>
+          </a:lstStyle>
+          <a:p>
+            <a:pPr algn="ctr"/>
+            <a:r>
+              <a:rPr lang="en-US" sz="1200" dirty="0">
+                <a:latin typeface="Arial" panose="020B0604020202020204" pitchFamily="34" charset="0"/>
+                <a:cs typeface="Arial" panose="020B0604020202020204" pitchFamily="34" charset="0"/>
+              </a:rPr>
+              <a:t>CloudWatch Log Group</a:t>
+            </a:r>
+          </a:p>
+        </p:txBody>
+      </p:sp>
+      <p:sp>
+        <p:nvSpPr>
+          <p:cNvPr id="130" name="TextBox 129">
+            <a:extLst>
+              <a:ext uri="{FF2B5EF4-FFF2-40B4-BE49-F238E27FC236}">
+                <a16:creationId xmlns:a16="http://schemas.microsoft.com/office/drawing/2014/main" id="{8D4C5C94-FD55-4958-94CD-9C621E29B0AE}"/>
+              </a:ext>
+            </a:extLst>
+          </p:cNvPr>
+          <p:cNvSpPr txBox="1"/>
+          <p:nvPr/>
+        </p:nvSpPr>
+        <p:spPr>
+          <a:xfrm>
+            <a:off x="1641809" y="2718625"/>
+            <a:ext cx="1338642" cy="461665"/>
+          </a:xfrm>
+          <a:prstGeom prst="rect">
+            <a:avLst/>
+          </a:prstGeom>
+          <a:noFill/>
+        </p:spPr>
+        <p:txBody>
+          <a:bodyPr wrap="square" rtlCol="0">
+            <a:spAutoFit/>
+          </a:bodyPr>
+          <a:lstStyle/>
+          <a:p>
+            <a:pPr algn="ctr"/>
+            <a:r>
+              <a:rPr lang="en-US" sz="1200" dirty="0">
+                <a:latin typeface="Arial" panose="020B0604020202020204" pitchFamily="34" charset="0"/>
+                <a:cs typeface="Arial" panose="020B0604020202020204" pitchFamily="34" charset="0"/>
+              </a:rPr>
+              <a:t>AWS CloudFormation</a:t>
+            </a:r>
+          </a:p>
+        </p:txBody>
+      </p:sp>
+      <p:pic>
+        <p:nvPicPr>
+          <p:cNvPr id="138" name="Graphic 13">
+            <a:extLst>
+              <a:ext uri="{FF2B5EF4-FFF2-40B4-BE49-F238E27FC236}">
+                <a16:creationId xmlns:a16="http://schemas.microsoft.com/office/drawing/2014/main" id="{DD93BA21-ED60-4BEA-8CCB-AB48DD1F7F7F}"/>
+              </a:ext>
+            </a:extLst>
+          </p:cNvPr>
+          <p:cNvPicPr>
+            <a:picLocks noChangeAspect="1" noChangeArrowheads="1"/>
+          </p:cNvPicPr>
+          <p:nvPr/>
+        </p:nvPicPr>
+        <p:blipFill>
+          <a:blip r:embed="rId7">
+            <a:extLst>
+              <a:ext uri="{28A0092B-C50C-407E-A947-70E740481C1C}">
+                <a14:useLocalDpi xmlns:a14="http://schemas.microsoft.com/office/drawing/2010/main" val="0"/>
+              </a:ext>
+            </a:extLst>
+          </a:blip>
+          <a:srcRect/>
+          <a:stretch>
+            <a:fillRect/>
+          </a:stretch>
+        </p:blipFill>
+        <p:spPr bwMode="auto">
+          <a:xfrm>
+            <a:off x="6058274" y="2185191"/>
+            <a:ext cx="760770" cy="760770"/>
+          </a:xfrm>
+          <a:prstGeom prst="rect">
+            <a:avLst/>
+          </a:prstGeom>
+          <a:noFill/>
+          <a:ln>
+            <a:noFill/>
+          </a:ln>
+          <a:extLst>
+            <a:ext uri="{909E8E84-426E-40DD-AFC4-6F175D3DCCD1}">
+              <a14:hiddenFill xmlns:a14="http://schemas.microsoft.com/office/drawing/2010/main">
+                <a:solidFill>
+                  <a:srgbClr val="FFFFFF"/>
+                </a:solidFill>
+              </a14:hiddenFill>
+            </a:ext>
+            <a:ext uri="{91240B29-F687-4F45-9708-019B960494DF}">
+              <a14:hiddenLine xmlns:a14="http://schemas.microsoft.com/office/drawing/2010/main" w="9525">
+                <a:solidFill>
+                  <a:srgbClr val="000000"/>
+                </a:solidFill>
+                <a:miter lim="800000"/>
+                <a:headEnd/>
+                <a:tailEnd/>
+              </a14:hiddenLine>
+            </a:ext>
+          </a:extLst>
+        </p:spPr>
+      </p:pic>
+      <p:pic>
+        <p:nvPicPr>
+          <p:cNvPr id="160" name="Graphic 7">
+            <a:extLst>
+              <a:ext uri="{FF2B5EF4-FFF2-40B4-BE49-F238E27FC236}">
+                <a16:creationId xmlns:a16="http://schemas.microsoft.com/office/drawing/2014/main" id="{0B13130F-B51E-4BFD-AECE-120AC8A6CA73}"/>
+              </a:ext>
+            </a:extLst>
+          </p:cNvPr>
+          <p:cNvPicPr>
+            <a:picLocks noChangeAspect="1" noChangeArrowheads="1"/>
+          </p:cNvPicPr>
+          <p:nvPr/>
+        </p:nvPicPr>
+        <p:blipFill>
+          <a:blip r:embed="rId8">
+            <a:extLst>
+              <a:ext uri="{28A0092B-C50C-407E-A947-70E740481C1C}">
+                <a14:useLocalDpi xmlns:a14="http://schemas.microsoft.com/office/drawing/2010/main" val="0"/>
+              </a:ext>
+            </a:extLst>
+          </a:blip>
+          <a:srcRect/>
+          <a:stretch>
+            <a:fillRect/>
+          </a:stretch>
+        </p:blipFill>
+        <p:spPr bwMode="auto">
+          <a:xfrm>
+            <a:off x="6058274" y="4012223"/>
+            <a:ext cx="760770" cy="760770"/>
+          </a:xfrm>
+          <a:prstGeom prst="rect">
+            <a:avLst/>
+          </a:prstGeom>
+          <a:noFill/>
+          <a:ln>
+            <a:noFill/>
+          </a:ln>
+          <a:extLst>
+            <a:ext uri="{909E8E84-426E-40DD-AFC4-6F175D3DCCD1}">
+              <a14:hiddenFill xmlns:a14="http://schemas.microsoft.com/office/drawing/2010/main">
+                <a:solidFill>
+                  <a:srgbClr val="FFFFFF"/>
+                </a:solidFill>
+              </a14:hiddenFill>
+            </a:ext>
+            <a:ext uri="{91240B29-F687-4F45-9708-019B960494DF}">
+              <a14:hiddenLine xmlns:a14="http://schemas.microsoft.com/office/drawing/2010/main" w="9525">
+                <a:solidFill>
+                  <a:srgbClr val="000000"/>
+                </a:solidFill>
+                <a:miter lim="800000"/>
+                <a:headEnd/>
+                <a:tailEnd/>
+              </a14:hiddenLine>
+            </a:ext>
+          </a:extLst>
+        </p:spPr>
+      </p:pic>
+      <p:pic>
+        <p:nvPicPr>
+          <p:cNvPr id="173" name="Graphic 21">
+            <a:extLst>
+              <a:ext uri="{FF2B5EF4-FFF2-40B4-BE49-F238E27FC236}">
+                <a16:creationId xmlns:a16="http://schemas.microsoft.com/office/drawing/2014/main" id="{EE9A2C89-D760-44AD-9846-59BF08E6A6F6}"/>
+              </a:ext>
+            </a:extLst>
+          </p:cNvPr>
+          <p:cNvPicPr>
+            <a:picLocks noChangeAspect="1" noChangeArrowheads="1"/>
+          </p:cNvPicPr>
+          <p:nvPr/>
+        </p:nvPicPr>
+        <p:blipFill>
+          <a:blip r:embed="rId9">
+            <a:extLst>
+              <a:ext uri="{28A0092B-C50C-407E-A947-70E740481C1C}">
+                <a14:useLocalDpi xmlns:a14="http://schemas.microsoft.com/office/drawing/2010/main" val="0"/>
+              </a:ext>
+            </a:extLst>
+          </a:blip>
+          <a:srcRect/>
+          <a:stretch>
+            <a:fillRect/>
+          </a:stretch>
+        </p:blipFill>
+        <p:spPr bwMode="auto">
+          <a:xfrm>
+            <a:off x="1930350" y="1874472"/>
+            <a:ext cx="760770" cy="760770"/>
+          </a:xfrm>
+          <a:prstGeom prst="rect">
+            <a:avLst/>
+          </a:prstGeom>
+          <a:noFill/>
+          <a:ln>
+            <a:noFill/>
+          </a:ln>
+          <a:extLst>
+            <a:ext uri="{909E8E84-426E-40DD-AFC4-6F175D3DCCD1}">
+              <a14:hiddenFill xmlns:a14="http://schemas.microsoft.com/office/drawing/2010/main">
+                <a:solidFill>
+                  <a:srgbClr val="FFFFFF"/>
+                </a:solidFill>
+              </a14:hiddenFill>
+            </a:ext>
+            <a:ext uri="{91240B29-F687-4F45-9708-019B960494DF}">
+              <a14:hiddenLine xmlns:a14="http://schemas.microsoft.com/office/drawing/2010/main" w="9525">
+                <a:solidFill>
+                  <a:srgbClr val="000000"/>
+                </a:solidFill>
+                <a:miter lim="800000"/>
+                <a:headEnd/>
+                <a:tailEnd/>
+              </a14:hiddenLine>
+            </a:ext>
+          </a:extLst>
+        </p:spPr>
+      </p:pic>
+      <p:sp>
+        <p:nvSpPr>
+          <p:cNvPr id="175" name="Rectangle 174">
+            <a:extLst>
+              <a:ext uri="{FF2B5EF4-FFF2-40B4-BE49-F238E27FC236}">
+                <a16:creationId xmlns:a16="http://schemas.microsoft.com/office/drawing/2014/main" id="{E23EF82D-34D3-46B6-978C-7B6A8238A22B}"/>
               </a:ext>
             </a:extLst>
           </p:cNvPr>
@@ -4113,8 +4445,157 @@
         </p:nvSpPr>
         <p:spPr>
           <a:xfrm>
-            <a:off x="4410764" y="2037086"/>
-            <a:ext cx="253435" cy="212902"/>
+            <a:off x="1359827" y="993057"/>
+            <a:ext cx="9424877" cy="5274236"/>
+          </a:xfrm>
+          <a:prstGeom prst="rect">
+            <a:avLst/>
+          </a:prstGeom>
+          <a:noFill/>
+          <a:ln w="12700">
+            <a:solidFill>
+              <a:srgbClr val="5B9CD5"/>
+            </a:solidFill>
+            <a:prstDash val="sysDash"/>
+          </a:ln>
+        </p:spPr>
+        <p:style>
+          <a:lnRef idx="2">
+            <a:schemeClr val="accent1">
+              <a:shade val="50000"/>
+            </a:schemeClr>
+          </a:lnRef>
+          <a:fillRef idx="1">
+            <a:schemeClr val="accent1"/>
+          </a:fillRef>
+          <a:effectRef idx="0">
+            <a:schemeClr val="accent1"/>
+          </a:effectRef>
+          <a:fontRef idx="minor">
+            <a:schemeClr val="lt1"/>
+          </a:fontRef>
+        </p:style>
+        <p:txBody>
+          <a:bodyPr lIns="502920" tIns="91440"/>
+          <a:lstStyle/>
+          <a:p>
+            <a:pPr eaLnBrk="1" fontAlgn="auto" hangingPunct="1">
+              <a:spcBef>
+                <a:spcPts val="0"/>
+              </a:spcBef>
+              <a:spcAft>
+                <a:spcPts val="0"/>
+              </a:spcAft>
+              <a:defRPr/>
+            </a:pPr>
+            <a:r>
+              <a:rPr lang="en-US" sz="1200" dirty="0">
+                <a:solidFill>
+                  <a:srgbClr val="5B9CD5"/>
+                </a:solidFill>
+                <a:latin typeface="Arial" panose="020B0604020202020204" pitchFamily="34" charset="0"/>
+                <a:cs typeface="Arial" panose="020B0604020202020204" pitchFamily="34" charset="0"/>
+              </a:rPr>
+              <a:t>   Home Region</a:t>
+            </a:r>
+          </a:p>
+        </p:txBody>
+      </p:sp>
+      <p:pic>
+        <p:nvPicPr>
+          <p:cNvPr id="176" name="Graphic 175">
+            <a:extLst>
+              <a:ext uri="{FF2B5EF4-FFF2-40B4-BE49-F238E27FC236}">
+                <a16:creationId xmlns:a16="http://schemas.microsoft.com/office/drawing/2014/main" id="{79BE28C9-BA1C-439C-A7D3-8AB7EFF8AFC4}"/>
+              </a:ext>
+            </a:extLst>
+          </p:cNvPr>
+          <p:cNvPicPr>
+            <a:picLocks noChangeAspect="1"/>
+          </p:cNvPicPr>
+          <p:nvPr/>
+        </p:nvPicPr>
+        <p:blipFill>
+          <a:blip r:embed="rId10">
+            <a:extLst>
+              <a:ext uri="{96DAC541-7B7A-43D3-8B79-37D633B846F1}">
+                <asvg:svgBlip xmlns:asvg="http://schemas.microsoft.com/office/drawing/2016/SVG/main" r:embed="rId11"/>
+              </a:ext>
+            </a:extLst>
+          </a:blip>
+          <a:stretch>
+            <a:fillRect/>
+          </a:stretch>
+        </p:blipFill>
+        <p:spPr>
+          <a:xfrm>
+            <a:off x="1352415" y="993057"/>
+            <a:ext cx="537059" cy="537059"/>
+          </a:xfrm>
+          <a:prstGeom prst="rect">
+            <a:avLst/>
+          </a:prstGeom>
+        </p:spPr>
+      </p:pic>
+      <p:cxnSp>
+        <p:nvCxnSpPr>
+          <p:cNvPr id="177" name="Straight Arrow Connector 176">
+            <a:extLst>
+              <a:ext uri="{FF2B5EF4-FFF2-40B4-BE49-F238E27FC236}">
+                <a16:creationId xmlns:a16="http://schemas.microsoft.com/office/drawing/2014/main" id="{4A73DC17-2E0A-47FF-927C-2082DB636979}"/>
+              </a:ext>
+            </a:extLst>
+          </p:cNvPr>
+          <p:cNvCxnSpPr>
+            <a:cxnSpLocks/>
+            <a:stCxn id="122" idx="2"/>
+            <a:endCxn id="160" idx="0"/>
+          </p:cNvCxnSpPr>
+          <p:nvPr/>
+        </p:nvCxnSpPr>
+        <p:spPr>
+          <a:xfrm flipH="1">
+            <a:off x="6438659" y="3187665"/>
+            <a:ext cx="5081" cy="824558"/>
+          </a:xfrm>
+          <a:prstGeom prst="straightConnector1">
+            <a:avLst/>
+          </a:prstGeom>
+          <a:ln>
+            <a:tailEnd type="triangle"/>
+          </a:ln>
+        </p:spPr>
+        <p:style>
+          <a:lnRef idx="1">
+            <a:schemeClr val="dk1"/>
+          </a:lnRef>
+          <a:fillRef idx="0">
+            <a:schemeClr val="dk1"/>
+          </a:fillRef>
+          <a:effectRef idx="0">
+            <a:schemeClr val="dk1"/>
+          </a:effectRef>
+          <a:fontRef idx="minor">
+            <a:schemeClr val="tx1"/>
+          </a:fontRef>
+        </p:style>
+      </p:cxnSp>
+      <p:sp>
+        <p:nvSpPr>
+          <p:cNvPr id="235" name="Oval 234">
+            <a:extLst>
+              <a:ext uri="{FF2B5EF4-FFF2-40B4-BE49-F238E27FC236}">
+                <a16:creationId xmlns:a16="http://schemas.microsoft.com/office/drawing/2014/main" id="{1BDB1ABD-271A-40FF-9892-B5B91A5F6E19}"/>
+              </a:ext>
+            </a:extLst>
+          </p:cNvPr>
+          <p:cNvSpPr/>
+          <p:nvPr/>
+        </p:nvSpPr>
+        <p:spPr>
+          <a:xfrm>
+            <a:off x="754270" y="1178840"/>
+            <a:ext cx="356742" cy="291049"/>
           </a:xfrm>
           <a:prstGeom prst="ellipse">
             <a:avLst/>
@@ -4161,10 +4642,376 @@
       </p:sp>
       <p:sp>
         <p:nvSpPr>
-          <p:cNvPr id="227" name="Oval 226">
-            <a:extLst>
-              <a:ext uri="{FF2B5EF4-FFF2-40B4-BE49-F238E27FC236}">
-                <a16:creationId xmlns:a16="http://schemas.microsoft.com/office/drawing/2014/main" id="{F0D1735B-0005-B145-8C48-3E3934A1D64E}"/>
+          <p:cNvPr id="104" name="TextBox 103">
+            <a:extLst>
+              <a:ext uri="{FF2B5EF4-FFF2-40B4-BE49-F238E27FC236}">
+                <a16:creationId xmlns:a16="http://schemas.microsoft.com/office/drawing/2014/main" id="{FAA82B51-6E98-0AF9-5BD6-B0B4BEC402B7}"/>
+              </a:ext>
+            </a:extLst>
+          </p:cNvPr>
+          <p:cNvSpPr txBox="1"/>
+          <p:nvPr/>
+        </p:nvSpPr>
+        <p:spPr>
+          <a:xfrm>
+            <a:off x="1737655" y="5847926"/>
+            <a:ext cx="1103001" cy="276999"/>
+          </a:xfrm>
+          <a:prstGeom prst="rect">
+            <a:avLst/>
+          </a:prstGeom>
+          <a:noFill/>
+        </p:spPr>
+        <p:txBody>
+          <a:bodyPr wrap="square" rtlCol="0">
+            <a:spAutoFit/>
+          </a:bodyPr>
+          <a:lstStyle/>
+          <a:p>
+            <a:pPr algn="ctr"/>
+            <a:r>
+              <a:rPr lang="en-US" sz="1200" dirty="0">
+                <a:latin typeface="Arial" panose="020B0604020202020204" pitchFamily="34" charset="0"/>
+                <a:cs typeface="Arial" panose="020B0604020202020204" pitchFamily="34" charset="0"/>
+              </a:rPr>
+              <a:t>Lambda Role</a:t>
+            </a:r>
+          </a:p>
+        </p:txBody>
+      </p:sp>
+      <p:pic>
+        <p:nvPicPr>
+          <p:cNvPr id="105" name="Graphic 104">
+            <a:extLst>
+              <a:ext uri="{FF2B5EF4-FFF2-40B4-BE49-F238E27FC236}">
+                <a16:creationId xmlns:a16="http://schemas.microsoft.com/office/drawing/2014/main" id="{D19144BD-63B5-E1C9-A3D2-74AAD0B20668}"/>
+              </a:ext>
+            </a:extLst>
+          </p:cNvPr>
+          <p:cNvPicPr>
+            <a:picLocks noChangeAspect="1"/>
+          </p:cNvPicPr>
+          <p:nvPr/>
+        </p:nvPicPr>
+        <p:blipFill>
+          <a:blip r:embed="rId12">
+            <a:extLst>
+              <a:ext uri="{96DAC541-7B7A-43D3-8B79-37D633B846F1}">
+                <asvg:svgBlip xmlns:asvg="http://schemas.microsoft.com/office/drawing/2016/SVG/main" r:embed="rId13"/>
+              </a:ext>
+            </a:extLst>
+          </a:blip>
+          <a:stretch>
+            <a:fillRect/>
+          </a:stretch>
+        </p:blipFill>
+        <p:spPr>
+          <a:xfrm>
+            <a:off x="1908771" y="5087156"/>
+            <a:ext cx="760770" cy="760770"/>
+          </a:xfrm>
+          <a:prstGeom prst="rect">
+            <a:avLst/>
+          </a:prstGeom>
+        </p:spPr>
+      </p:pic>
+      <p:cxnSp>
+        <p:nvCxnSpPr>
+          <p:cNvPr id="13" name="Straight Arrow Connector 12">
+            <a:extLst>
+              <a:ext uri="{FF2B5EF4-FFF2-40B4-BE49-F238E27FC236}">
+                <a16:creationId xmlns:a16="http://schemas.microsoft.com/office/drawing/2014/main" id="{44BA7D71-1277-AC0A-95CF-F3E8F899F429}"/>
+              </a:ext>
+            </a:extLst>
+          </p:cNvPr>
+          <p:cNvCxnSpPr>
+            <a:cxnSpLocks/>
+          </p:cNvCxnSpPr>
+          <p:nvPr/>
+        </p:nvCxnSpPr>
+        <p:spPr>
+          <a:xfrm>
+            <a:off x="6945851" y="2565576"/>
+            <a:ext cx="994641" cy="3182"/>
+          </a:xfrm>
+          <a:prstGeom prst="straightConnector1">
+            <a:avLst/>
+          </a:prstGeom>
+          <a:ln>
+            <a:tailEnd type="triangle"/>
+          </a:ln>
+        </p:spPr>
+        <p:style>
+          <a:lnRef idx="1">
+            <a:schemeClr val="dk1"/>
+          </a:lnRef>
+          <a:fillRef idx="0">
+            <a:schemeClr val="dk1"/>
+          </a:fillRef>
+          <a:effectRef idx="0">
+            <a:schemeClr val="dk1"/>
+          </a:effectRef>
+          <a:fontRef idx="minor">
+            <a:schemeClr val="tx1"/>
+          </a:fontRef>
+        </p:style>
+      </p:cxnSp>
+      <p:pic>
+        <p:nvPicPr>
+          <p:cNvPr id="12" name="Graphic 19" descr="AWS CodeBuild service icon.">
+            <a:extLst>
+              <a:ext uri="{FF2B5EF4-FFF2-40B4-BE49-F238E27FC236}">
+                <a16:creationId xmlns:a16="http://schemas.microsoft.com/office/drawing/2014/main" id="{2AC95550-4CB9-684D-7F1E-B24204A7EE7A}"/>
+              </a:ext>
+            </a:extLst>
+          </p:cNvPr>
+          <p:cNvPicPr>
+            <a:picLocks noChangeAspect="1" noChangeArrowheads="1"/>
+          </p:cNvPicPr>
+          <p:nvPr/>
+        </p:nvPicPr>
+        <p:blipFill>
+          <a:blip r:embed="rId14">
+            <a:extLst>
+              <a:ext uri="{96DAC541-7B7A-43D3-8B79-37D633B846F1}">
+                <asvg:svgBlip xmlns:asvg="http://schemas.microsoft.com/office/drawing/2016/SVG/main" r:embed="rId15"/>
+              </a:ext>
+            </a:extLst>
+          </a:blip>
+          <a:srcRect/>
+          <a:stretch/>
+        </p:blipFill>
+        <p:spPr bwMode="auto">
+          <a:xfrm>
+            <a:off x="8080268" y="2188373"/>
+            <a:ext cx="760770" cy="760770"/>
+          </a:xfrm>
+          <a:prstGeom prst="rect">
+            <a:avLst/>
+          </a:prstGeom>
+          <a:noFill/>
+          <a:ln>
+            <a:noFill/>
+          </a:ln>
+          <a:extLst>
+            <a:ext uri="{909E8E84-426E-40DD-AFC4-6F175D3DCCD1}">
+              <a14:hiddenFill xmlns:a14="http://schemas.microsoft.com/office/drawing/2010/main">
+                <a:solidFill>
+                  <a:srgbClr val="FFFFFF"/>
+                </a:solidFill>
+              </a14:hiddenFill>
+            </a:ext>
+            <a:ext uri="{91240B29-F687-4F45-9708-019B960494DF}">
+              <a14:hiddenLine xmlns:a14="http://schemas.microsoft.com/office/drawing/2010/main" w="9525">
+                <a:solidFill>
+                  <a:srgbClr val="000000"/>
+                </a:solidFill>
+                <a:miter lim="800000"/>
+                <a:headEnd/>
+                <a:tailEnd/>
+              </a14:hiddenLine>
+            </a:ext>
+          </a:extLst>
+        </p:spPr>
+      </p:pic>
+      <p:sp>
+        <p:nvSpPr>
+          <p:cNvPr id="14" name="TextBox 11">
+            <a:extLst>
+              <a:ext uri="{FF2B5EF4-FFF2-40B4-BE49-F238E27FC236}">
+                <a16:creationId xmlns:a16="http://schemas.microsoft.com/office/drawing/2014/main" id="{28580F6A-78E0-AE44-4956-CFE18797EB77}"/>
+              </a:ext>
+            </a:extLst>
+          </p:cNvPr>
+          <p:cNvSpPr txBox="1">
+            <a:spLocks noChangeArrowheads="1"/>
+          </p:cNvSpPr>
+          <p:nvPr/>
+        </p:nvSpPr>
+        <p:spPr bwMode="auto">
+          <a:xfrm>
+            <a:off x="7670148" y="2910665"/>
+            <a:ext cx="1581010" cy="276999"/>
+          </a:xfrm>
+          <a:prstGeom prst="rect">
+            <a:avLst/>
+          </a:prstGeom>
+          <a:noFill/>
+          <a:ln>
+            <a:noFill/>
+          </a:ln>
+          <a:extLst>
+            <a:ext uri="{909E8E84-426E-40DD-AFC4-6F175D3DCCD1}">
+              <a14:hiddenFill xmlns:a14="http://schemas.microsoft.com/office/drawing/2010/main">
+                <a:solidFill>
+                  <a:srgbClr val="FFFFFF"/>
+                </a:solidFill>
+              </a14:hiddenFill>
+            </a:ext>
+            <a:ext uri="{91240B29-F687-4F45-9708-019B960494DF}">
+              <a14:hiddenLine xmlns:a14="http://schemas.microsoft.com/office/drawing/2010/main" w="9525">
+                <a:solidFill>
+                  <a:srgbClr val="000000"/>
+                </a:solidFill>
+                <a:miter lim="800000"/>
+                <a:headEnd/>
+                <a:tailEnd/>
+              </a14:hiddenLine>
+            </a:ext>
+          </a:extLst>
+        </p:spPr>
+        <p:style>
+          <a:lnRef idx="0">
+            <a:scrgbClr r="0" g="0" b="0"/>
+          </a:lnRef>
+          <a:fillRef idx="0">
+            <a:scrgbClr r="0" g="0" b="0"/>
+          </a:fillRef>
+          <a:effectRef idx="0">
+            <a:scrgbClr r="0" g="0" b="0"/>
+          </a:effectRef>
+          <a:fontRef idx="major"/>
+        </p:style>
+        <p:txBody>
+          <a:bodyPr wrap="square">
+            <a:spAutoFit/>
+          </a:bodyPr>
+          <a:lstStyle>
+            <a:lvl1pPr>
+              <a:defRPr>
+                <a:latin typeface="+mj-lt"/>
+                <a:ea typeface="+mj-ea"/>
+                <a:cs typeface="+mj-cs"/>
+              </a:defRPr>
+            </a:lvl1pPr>
+            <a:lvl2pPr>
+              <a:defRPr>
+                <a:latin typeface="+mj-lt"/>
+                <a:ea typeface="+mj-ea"/>
+                <a:cs typeface="+mj-cs"/>
+              </a:defRPr>
+            </a:lvl2pPr>
+            <a:lvl3pPr>
+              <a:defRPr>
+                <a:latin typeface="+mj-lt"/>
+                <a:ea typeface="+mj-ea"/>
+                <a:cs typeface="+mj-cs"/>
+              </a:defRPr>
+            </a:lvl3pPr>
+            <a:lvl4pPr>
+              <a:defRPr>
+                <a:latin typeface="+mj-lt"/>
+                <a:ea typeface="+mj-ea"/>
+                <a:cs typeface="+mj-cs"/>
+              </a:defRPr>
+            </a:lvl4pPr>
+            <a:lvl5pPr>
+              <a:defRPr>
+                <a:latin typeface="+mj-lt"/>
+                <a:ea typeface="+mj-ea"/>
+                <a:cs typeface="+mj-cs"/>
+              </a:defRPr>
+            </a:lvl5pPr>
+            <a:lvl6pPr>
+              <a:defRPr>
+                <a:latin typeface="+mj-lt"/>
+                <a:ea typeface="+mj-ea"/>
+                <a:cs typeface="+mj-cs"/>
+              </a:defRPr>
+            </a:lvl6pPr>
+            <a:lvl7pPr>
+              <a:defRPr>
+                <a:latin typeface="+mj-lt"/>
+                <a:ea typeface="+mj-ea"/>
+                <a:cs typeface="+mj-cs"/>
+              </a:defRPr>
+            </a:lvl7pPr>
+            <a:lvl8pPr>
+              <a:defRPr>
+                <a:latin typeface="+mj-lt"/>
+                <a:ea typeface="+mj-ea"/>
+                <a:cs typeface="+mj-cs"/>
+              </a:defRPr>
+            </a:lvl8pPr>
+            <a:lvl9pPr>
+              <a:defRPr>
+                <a:latin typeface="+mj-lt"/>
+                <a:ea typeface="+mj-ea"/>
+                <a:cs typeface="+mj-cs"/>
+              </a:defRPr>
+            </a:lvl9pPr>
+          </a:lstStyle>
+          <a:p>
+            <a:pPr algn="ctr" eaLnBrk="1" hangingPunct="1"/>
+            <a:r>
+              <a:rPr lang="en-US" altLang="en-US" sz="1200" dirty="0">
+                <a:latin typeface="Arial" panose="020B0604020202020204" pitchFamily="34" charset="0"/>
+                <a:ea typeface="Amazon Ember" panose="020B0603020204020204" pitchFamily="34" charset="0"/>
+                <a:cs typeface="Arial" panose="020B0604020202020204" pitchFamily="34" charset="0"/>
+              </a:rPr>
+              <a:t>AWS </a:t>
+            </a:r>
+            <a:r>
+              <a:rPr lang="en-US" altLang="en-US" sz="1200" dirty="0" err="1">
+                <a:latin typeface="Arial" panose="020B0604020202020204" pitchFamily="34" charset="0"/>
+                <a:ea typeface="Amazon Ember" panose="020B0603020204020204" pitchFamily="34" charset="0"/>
+                <a:cs typeface="Arial" panose="020B0604020202020204" pitchFamily="34" charset="0"/>
+              </a:rPr>
+              <a:t>CodeBuild</a:t>
+            </a:r>
+            <a:endParaRPr lang="en-US" altLang="en-US" sz="1200" dirty="0">
+              <a:latin typeface="Arial" panose="020B0604020202020204" pitchFamily="34" charset="0"/>
+              <a:ea typeface="Amazon Ember" panose="020B0603020204020204" pitchFamily="34" charset="0"/>
+              <a:cs typeface="Arial" panose="020B0604020202020204" pitchFamily="34" charset="0"/>
+            </a:endParaRPr>
+          </a:p>
+        </p:txBody>
+      </p:sp>
+      <p:sp>
+        <p:nvSpPr>
+          <p:cNvPr id="21" name="TextBox 20">
+            <a:extLst>
+              <a:ext uri="{FF2B5EF4-FFF2-40B4-BE49-F238E27FC236}">
+                <a16:creationId xmlns:a16="http://schemas.microsoft.com/office/drawing/2014/main" id="{BC6A5763-5D15-3E92-6EB9-B88E33390E39}"/>
+              </a:ext>
+            </a:extLst>
+          </p:cNvPr>
+          <p:cNvSpPr txBox="1"/>
+          <p:nvPr/>
+        </p:nvSpPr>
+        <p:spPr>
+          <a:xfrm>
+            <a:off x="1366366" y="4265821"/>
+            <a:ext cx="1888737" cy="461665"/>
+          </a:xfrm>
+          <a:prstGeom prst="rect">
+            <a:avLst/>
+          </a:prstGeom>
+          <a:noFill/>
+        </p:spPr>
+        <p:txBody>
+          <a:bodyPr wrap="square" rtlCol="0">
+            <a:spAutoFit/>
+          </a:bodyPr>
+          <a:lstStyle/>
+          <a:p>
+            <a:pPr algn="ctr"/>
+            <a:r>
+              <a:rPr lang="en-US" sz="1200" dirty="0">
+                <a:latin typeface="Arial" panose="020B0604020202020204" pitchFamily="34" charset="0"/>
+                <a:cs typeface="Arial" panose="020B0604020202020204" pitchFamily="34" charset="0"/>
+              </a:rPr>
+              <a:t>CFCT CloudFormation Stack</a:t>
+            </a:r>
+          </a:p>
+        </p:txBody>
+      </p:sp>
+      <p:sp>
+        <p:nvSpPr>
+          <p:cNvPr id="26" name="Oval 25">
+            <a:extLst>
+              <a:ext uri="{FF2B5EF4-FFF2-40B4-BE49-F238E27FC236}">
+                <a16:creationId xmlns:a16="http://schemas.microsoft.com/office/drawing/2014/main" id="{F9E1D65C-4C87-D4A6-EFC6-5908E824BC56}"/>
               </a:ext>
             </a:extLst>
           </p:cNvPr>
@@ -4173,8 +5020,8 @@
         </p:nvSpPr>
         <p:spPr>
           <a:xfrm>
-            <a:off x="5200547" y="3079919"/>
-            <a:ext cx="253435" cy="212902"/>
+            <a:off x="1751979" y="1687256"/>
+            <a:ext cx="356742" cy="291049"/>
           </a:xfrm>
           <a:prstGeom prst="ellipse">
             <a:avLst/>
@@ -4221,10 +5068,10 @@
       </p:sp>
       <p:sp>
         <p:nvSpPr>
-          <p:cNvPr id="68" name="Rectangle 67">
-            <a:extLst>
-              <a:ext uri="{FF2B5EF4-FFF2-40B4-BE49-F238E27FC236}">
-                <a16:creationId xmlns:a16="http://schemas.microsoft.com/office/drawing/2014/main" id="{F56113B6-D718-8249-9540-C31B7D054BDD}"/>
+          <p:cNvPr id="28" name="Oval 27">
+            <a:extLst>
+              <a:ext uri="{FF2B5EF4-FFF2-40B4-BE49-F238E27FC236}">
+                <a16:creationId xmlns:a16="http://schemas.microsoft.com/office/drawing/2014/main" id="{3DF0751E-5205-038F-D1FD-F1C29BD9B219}"/>
               </a:ext>
             </a:extLst>
           </p:cNvPr>
@@ -4233,303 +5080,8 @@
         </p:nvSpPr>
         <p:spPr>
           <a:xfrm>
-            <a:off x="4588922" y="2509737"/>
-            <a:ext cx="3426670" cy="1828799"/>
-          </a:xfrm>
-          <a:prstGeom prst="rect">
-            <a:avLst/>
-          </a:prstGeom>
-          <a:noFill/>
-          <a:ln w="12700">
-            <a:solidFill>
-              <a:schemeClr val="tx1"/>
-            </a:solidFill>
-            <a:prstDash val="dash"/>
-          </a:ln>
-        </p:spPr>
-        <p:style>
-          <a:lnRef idx="2">
-            <a:schemeClr val="accent1">
-              <a:shade val="50000"/>
-            </a:schemeClr>
-          </a:lnRef>
-          <a:fillRef idx="1">
-            <a:schemeClr val="accent1"/>
-          </a:fillRef>
-          <a:effectRef idx="0">
-            <a:schemeClr val="accent1"/>
-          </a:effectRef>
-          <a:fontRef idx="minor">
-            <a:schemeClr val="lt1"/>
-          </a:fontRef>
-        </p:style>
-        <p:txBody>
-          <a:bodyPr rot="0" spcFirstLastPara="0" vertOverflow="overflow" horzOverflow="overflow" vert="horz" wrap="square" lIns="45720" tIns="0" rIns="0" bIns="0" numCol="1" spcCol="0" rtlCol="0" fromWordArt="0" anchor="t" anchorCtr="0" forceAA="0" compatLnSpc="1">
-            <a:noAutofit/>
-          </a:bodyPr>
-          <a:lstStyle/>
-          <a:p>
-            <a:r>
-              <a:rPr lang="en-US" sz="1100" b="1" dirty="0">
-                <a:solidFill>
-                  <a:schemeClr val="tx1"/>
-                </a:solidFill>
-                <a:latin typeface="Arial" panose="020B0604020202020204" pitchFamily="34" charset="0"/>
-                <a:cs typeface="Arial" panose="020B0604020202020204" pitchFamily="34" charset="0"/>
-              </a:rPr>
-              <a:t>Home-region</a:t>
-            </a:r>
-          </a:p>
-        </p:txBody>
-      </p:sp>
-      <p:sp>
-        <p:nvSpPr>
-          <p:cNvPr id="78" name="TextBox 31">
-            <a:extLst>
-              <a:ext uri="{FF2B5EF4-FFF2-40B4-BE49-F238E27FC236}">
-                <a16:creationId xmlns:a16="http://schemas.microsoft.com/office/drawing/2014/main" id="{41781371-D112-9343-B6E0-D4F1AAF40247}"/>
-              </a:ext>
-            </a:extLst>
-          </p:cNvPr>
-          <p:cNvSpPr txBox="1">
-            <a:spLocks noChangeArrowheads="1"/>
-          </p:cNvSpPr>
-          <p:nvPr/>
-        </p:nvSpPr>
-        <p:spPr bwMode="auto">
-          <a:xfrm>
-            <a:off x="6139004" y="3503072"/>
-            <a:ext cx="1685071" cy="430887"/>
-          </a:xfrm>
-          <a:prstGeom prst="rect">
-            <a:avLst/>
-          </a:prstGeom>
-          <a:noFill/>
-          <a:ln>
-            <a:noFill/>
-          </a:ln>
-          <a:extLst>
-            <a:ext uri="{909E8E84-426E-40DD-AFC4-6F175D3DCCD1}">
-              <a14:hiddenFill xmlns:a14="http://schemas.microsoft.com/office/drawing/2010/main">
-                <a:solidFill>
-                  <a:srgbClr val="FFFFFF"/>
-                </a:solidFill>
-              </a14:hiddenFill>
-            </a:ext>
-            <a:ext uri="{91240B29-F687-4F45-9708-019B960494DF}">
-              <a14:hiddenLine xmlns:a14="http://schemas.microsoft.com/office/drawing/2010/main" w="9525">
-                <a:solidFill>
-                  <a:srgbClr val="000000"/>
-                </a:solidFill>
-                <a:miter lim="800000"/>
-                <a:headEnd/>
-                <a:tailEnd/>
-              </a14:hiddenLine>
-            </a:ext>
-          </a:extLst>
-        </p:spPr>
-        <p:txBody>
-          <a:bodyPr wrap="square">
-            <a:spAutoFit/>
-          </a:bodyPr>
-          <a:lstStyle>
-            <a:lvl1pPr>
-              <a:defRPr>
-                <a:solidFill>
-                  <a:schemeClr val="tx1"/>
-                </a:solidFill>
-                <a:latin typeface="Calibri" panose="020F0502020204030204" pitchFamily="34" charset="0"/>
-              </a:defRPr>
-            </a:lvl1pPr>
-            <a:lvl2pPr marL="742950" indent="-285750">
-              <a:defRPr>
-                <a:solidFill>
-                  <a:schemeClr val="tx1"/>
-                </a:solidFill>
-                <a:latin typeface="Calibri" panose="020F0502020204030204" pitchFamily="34" charset="0"/>
-              </a:defRPr>
-            </a:lvl2pPr>
-            <a:lvl3pPr marL="1143000" indent="-228600">
-              <a:defRPr>
-                <a:solidFill>
-                  <a:schemeClr val="tx1"/>
-                </a:solidFill>
-                <a:latin typeface="Calibri" panose="020F0502020204030204" pitchFamily="34" charset="0"/>
-              </a:defRPr>
-            </a:lvl3pPr>
-            <a:lvl4pPr marL="1600200" indent="-228600">
-              <a:defRPr>
-                <a:solidFill>
-                  <a:schemeClr val="tx1"/>
-                </a:solidFill>
-                <a:latin typeface="Calibri" panose="020F0502020204030204" pitchFamily="34" charset="0"/>
-              </a:defRPr>
-            </a:lvl4pPr>
-            <a:lvl5pPr marL="2057400" indent="-228600">
-              <a:defRPr>
-                <a:solidFill>
-                  <a:schemeClr val="tx1"/>
-                </a:solidFill>
-                <a:latin typeface="Calibri" panose="020F0502020204030204" pitchFamily="34" charset="0"/>
-              </a:defRPr>
-            </a:lvl5pPr>
-            <a:lvl6pPr marL="2514600" indent="-228600" eaLnBrk="0" fontAlgn="base" hangingPunct="0">
-              <a:spcBef>
-                <a:spcPct val="0"/>
-              </a:spcBef>
-              <a:spcAft>
-                <a:spcPct val="0"/>
-              </a:spcAft>
-              <a:defRPr>
-                <a:solidFill>
-                  <a:schemeClr val="tx1"/>
-                </a:solidFill>
-                <a:latin typeface="Calibri" panose="020F0502020204030204" pitchFamily="34" charset="0"/>
-              </a:defRPr>
-            </a:lvl6pPr>
-            <a:lvl7pPr marL="2971800" indent="-228600" eaLnBrk="0" fontAlgn="base" hangingPunct="0">
-              <a:spcBef>
-                <a:spcPct val="0"/>
-              </a:spcBef>
-              <a:spcAft>
-                <a:spcPct val="0"/>
-              </a:spcAft>
-              <a:defRPr>
-                <a:solidFill>
-                  <a:schemeClr val="tx1"/>
-                </a:solidFill>
-                <a:latin typeface="Calibri" panose="020F0502020204030204" pitchFamily="34" charset="0"/>
-              </a:defRPr>
-            </a:lvl7pPr>
-            <a:lvl8pPr marL="3429000" indent="-228600" eaLnBrk="0" fontAlgn="base" hangingPunct="0">
-              <a:spcBef>
-                <a:spcPct val="0"/>
-              </a:spcBef>
-              <a:spcAft>
-                <a:spcPct val="0"/>
-              </a:spcAft>
-              <a:defRPr>
-                <a:solidFill>
-                  <a:schemeClr val="tx1"/>
-                </a:solidFill>
-                <a:latin typeface="Calibri" panose="020F0502020204030204" pitchFamily="34" charset="0"/>
-              </a:defRPr>
-            </a:lvl8pPr>
-            <a:lvl9pPr marL="3886200" indent="-228600" eaLnBrk="0" fontAlgn="base" hangingPunct="0">
-              <a:spcBef>
-                <a:spcPct val="0"/>
-              </a:spcBef>
-              <a:spcAft>
-                <a:spcPct val="0"/>
-              </a:spcAft>
-              <a:defRPr>
-                <a:solidFill>
-                  <a:schemeClr val="tx1"/>
-                </a:solidFill>
-                <a:latin typeface="Calibri" panose="020F0502020204030204" pitchFamily="34" charset="0"/>
-              </a:defRPr>
-            </a:lvl9pPr>
-          </a:lstStyle>
-          <a:p>
-            <a:pPr algn="ctr" eaLnBrk="1" hangingPunct="1"/>
-            <a:r>
-              <a:rPr lang="en-US" altLang="en-US" sz="1100" dirty="0">
-                <a:latin typeface="Arial" panose="020B0604020202020204" pitchFamily="34" charset="0"/>
-                <a:ea typeface="Amazon Ember" panose="020B0603020204020204" pitchFamily="34" charset="0"/>
-                <a:cs typeface="Arial" panose="020B0604020202020204" pitchFamily="34" charset="0"/>
-              </a:rPr>
-              <a:t>CFCT </a:t>
-            </a:r>
-          </a:p>
-          <a:p>
-            <a:pPr algn="ctr" eaLnBrk="1" hangingPunct="1"/>
-            <a:r>
-              <a:rPr lang="en-US" altLang="en-US" sz="1100" dirty="0">
-                <a:latin typeface="Arial" panose="020B0604020202020204" pitchFamily="34" charset="0"/>
-                <a:ea typeface="Amazon Ember" panose="020B0603020204020204" pitchFamily="34" charset="0"/>
-                <a:cs typeface="Arial" panose="020B0604020202020204" pitchFamily="34" charset="0"/>
-              </a:rPr>
-              <a:t>CloudFormation Stack</a:t>
-            </a:r>
-          </a:p>
-        </p:txBody>
-      </p:sp>
-      <p:pic>
-        <p:nvPicPr>
-          <p:cNvPr id="74" name="Graphic 34">
-            <a:extLst>
-              <a:ext uri="{FF2B5EF4-FFF2-40B4-BE49-F238E27FC236}">
-                <a16:creationId xmlns:a16="http://schemas.microsoft.com/office/drawing/2014/main" id="{7E9A781E-A35E-C242-A3B9-6FC6A310B8CF}"/>
-              </a:ext>
-            </a:extLst>
-          </p:cNvPr>
-          <p:cNvPicPr>
-            <a:picLocks noChangeAspect="1" noChangeArrowheads="1"/>
-          </p:cNvPicPr>
-          <p:nvPr/>
-        </p:nvPicPr>
-        <p:blipFill>
-          <a:blip r:embed="rId7">
-            <a:extLst>
-              <a:ext uri="{28A0092B-C50C-407E-A947-70E740481C1C}">
-                <a14:useLocalDpi xmlns:a14="http://schemas.microsoft.com/office/drawing/2010/main" val="0"/>
-              </a:ext>
-            </a:extLst>
-          </a:blip>
-          <a:srcRect/>
-          <a:stretch>
-            <a:fillRect/>
-          </a:stretch>
-        </p:blipFill>
-        <p:spPr bwMode="auto">
-          <a:xfrm>
-            <a:off x="6745171" y="3079919"/>
-            <a:ext cx="457200" cy="457200"/>
-          </a:xfrm>
-          <a:prstGeom prst="rect">
-            <a:avLst/>
-          </a:prstGeom>
-          <a:noFill/>
-          <a:ln>
-            <a:noFill/>
-          </a:ln>
-          <a:extLst>
-            <a:ext uri="{909E8E84-426E-40DD-AFC4-6F175D3DCCD1}">
-              <a14:hiddenFill xmlns:a14="http://schemas.microsoft.com/office/drawing/2010/main">
-                <a:solidFill>
-                  <a:srgbClr val="FFFFFF"/>
-                </a:solidFill>
-              </a14:hiddenFill>
-            </a:ext>
-            <a:ext uri="{91240B29-F687-4F45-9708-019B960494DF}">
-              <a14:hiddenLine xmlns:a14="http://schemas.microsoft.com/office/drawing/2010/main" w="9525">
-                <a:solidFill>
-                  <a:srgbClr val="000000"/>
-                </a:solidFill>
-                <a:miter lim="800000"/>
-                <a:headEnd/>
-                <a:tailEnd/>
-              </a14:hiddenLine>
-            </a:ext>
-          </a:extLst>
-        </p:spPr>
-      </p:pic>
-      <p:sp>
-        <p:nvSpPr>
-          <p:cNvPr id="89" name="Oval 88">
-            <a:extLst>
-              <a:ext uri="{FF2B5EF4-FFF2-40B4-BE49-F238E27FC236}">
-                <a16:creationId xmlns:a16="http://schemas.microsoft.com/office/drawing/2014/main" id="{C24704FF-9C2F-CC4F-9FC2-D1C33536B62A}"/>
-              </a:ext>
-            </a:extLst>
-          </p:cNvPr>
-          <p:cNvSpPr/>
-          <p:nvPr/>
-        </p:nvSpPr>
-        <p:spPr>
-          <a:xfrm>
-            <a:off x="6784083" y="3114530"/>
-            <a:ext cx="253435" cy="212902"/>
+            <a:off x="1730133" y="5076484"/>
+            <a:ext cx="356742" cy="291049"/>
           </a:xfrm>
           <a:prstGeom prst="ellipse">
             <a:avLst/>
@@ -4574,10 +5126,428 @@
           </a:p>
         </p:txBody>
       </p:sp>
+      <p:sp>
+        <p:nvSpPr>
+          <p:cNvPr id="29" name="Oval 28">
+            <a:extLst>
+              <a:ext uri="{FF2B5EF4-FFF2-40B4-BE49-F238E27FC236}">
+                <a16:creationId xmlns:a16="http://schemas.microsoft.com/office/drawing/2014/main" id="{2E93EB8A-BF03-7B1A-BC21-CAA698323757}"/>
+              </a:ext>
+            </a:extLst>
+          </p:cNvPr>
+          <p:cNvSpPr/>
+          <p:nvPr/>
+        </p:nvSpPr>
+        <p:spPr>
+          <a:xfrm>
+            <a:off x="5860408" y="1955727"/>
+            <a:ext cx="356742" cy="291049"/>
+          </a:xfrm>
+          <a:prstGeom prst="ellipse">
+            <a:avLst/>
+          </a:prstGeom>
+          <a:solidFill>
+            <a:schemeClr val="tx1"/>
+          </a:solidFill>
+          <a:ln>
+            <a:solidFill>
+              <a:schemeClr val="tx1"/>
+            </a:solidFill>
+          </a:ln>
+        </p:spPr>
+        <p:style>
+          <a:lnRef idx="2">
+            <a:schemeClr val="accent1">
+              <a:shade val="50000"/>
+            </a:schemeClr>
+          </a:lnRef>
+          <a:fillRef idx="1">
+            <a:schemeClr val="accent1"/>
+          </a:fillRef>
+          <a:effectRef idx="0">
+            <a:schemeClr val="accent1"/>
+          </a:effectRef>
+          <a:fontRef idx="minor">
+            <a:schemeClr val="lt1"/>
+          </a:fontRef>
+        </p:style>
+        <p:txBody>
+          <a:bodyPr lIns="0" tIns="0" rIns="0" bIns="0" rtlCol="0" anchor="ctr"/>
+          <a:lstStyle/>
+          <a:p>
+            <a:pPr algn="ctr"/>
+            <a:r>
+              <a:rPr lang="en-US" sz="800" dirty="0">
+                <a:latin typeface="Arial" panose="020B0604020202020204" pitchFamily="34" charset="0"/>
+                <a:cs typeface="Arial" panose="020B0604020202020204" pitchFamily="34" charset="0"/>
+              </a:rPr>
+              <a:t>1.3</a:t>
+            </a:r>
+          </a:p>
+        </p:txBody>
+      </p:sp>
+      <p:sp>
+        <p:nvSpPr>
+          <p:cNvPr id="30" name="Oval 29">
+            <a:extLst>
+              <a:ext uri="{FF2B5EF4-FFF2-40B4-BE49-F238E27FC236}">
+                <a16:creationId xmlns:a16="http://schemas.microsoft.com/office/drawing/2014/main" id="{6789C25E-99B7-D044-6A68-6F9B7A0E560C}"/>
+              </a:ext>
+            </a:extLst>
+          </p:cNvPr>
+          <p:cNvSpPr/>
+          <p:nvPr/>
+        </p:nvSpPr>
+        <p:spPr>
+          <a:xfrm>
+            <a:off x="7859060" y="1955727"/>
+            <a:ext cx="356742" cy="291049"/>
+          </a:xfrm>
+          <a:prstGeom prst="ellipse">
+            <a:avLst/>
+          </a:prstGeom>
+          <a:solidFill>
+            <a:schemeClr val="tx1"/>
+          </a:solidFill>
+          <a:ln>
+            <a:solidFill>
+              <a:schemeClr val="tx1"/>
+            </a:solidFill>
+          </a:ln>
+        </p:spPr>
+        <p:style>
+          <a:lnRef idx="2">
+            <a:schemeClr val="accent1">
+              <a:shade val="50000"/>
+            </a:schemeClr>
+          </a:lnRef>
+          <a:fillRef idx="1">
+            <a:schemeClr val="accent1"/>
+          </a:fillRef>
+          <a:effectRef idx="0">
+            <a:schemeClr val="accent1"/>
+          </a:effectRef>
+          <a:fontRef idx="minor">
+            <a:schemeClr val="lt1"/>
+          </a:fontRef>
+        </p:style>
+        <p:txBody>
+          <a:bodyPr lIns="0" tIns="0" rIns="0" bIns="0" rtlCol="0" anchor="ctr"/>
+          <a:lstStyle/>
+          <a:p>
+            <a:pPr algn="ctr"/>
+            <a:r>
+              <a:rPr lang="en-US" sz="800" dirty="0">
+                <a:latin typeface="Arial" panose="020B0604020202020204" pitchFamily="34" charset="0"/>
+                <a:cs typeface="Arial" panose="020B0604020202020204" pitchFamily="34" charset="0"/>
+              </a:rPr>
+              <a:t>1.5</a:t>
+            </a:r>
+          </a:p>
+        </p:txBody>
+      </p:sp>
+      <p:sp>
+        <p:nvSpPr>
+          <p:cNvPr id="32" name="Oval 31">
+            <a:extLst>
+              <a:ext uri="{FF2B5EF4-FFF2-40B4-BE49-F238E27FC236}">
+                <a16:creationId xmlns:a16="http://schemas.microsoft.com/office/drawing/2014/main" id="{CF82F8B0-D8BA-20D9-A452-6B9F3CF5BBEB}"/>
+              </a:ext>
+            </a:extLst>
+          </p:cNvPr>
+          <p:cNvSpPr/>
+          <p:nvPr/>
+        </p:nvSpPr>
+        <p:spPr>
+          <a:xfrm>
+            <a:off x="5879903" y="3960906"/>
+            <a:ext cx="356742" cy="291049"/>
+          </a:xfrm>
+          <a:prstGeom prst="ellipse">
+            <a:avLst/>
+          </a:prstGeom>
+          <a:solidFill>
+            <a:schemeClr val="tx1"/>
+          </a:solidFill>
+          <a:ln>
+            <a:solidFill>
+              <a:schemeClr val="tx1"/>
+            </a:solidFill>
+          </a:ln>
+        </p:spPr>
+        <p:style>
+          <a:lnRef idx="2">
+            <a:schemeClr val="accent1">
+              <a:shade val="50000"/>
+            </a:schemeClr>
+          </a:lnRef>
+          <a:fillRef idx="1">
+            <a:schemeClr val="accent1"/>
+          </a:fillRef>
+          <a:effectRef idx="0">
+            <a:schemeClr val="accent1"/>
+          </a:effectRef>
+          <a:fontRef idx="minor">
+            <a:schemeClr val="lt1"/>
+          </a:fontRef>
+        </p:style>
+        <p:txBody>
+          <a:bodyPr lIns="0" tIns="0" rIns="0" bIns="0" rtlCol="0" anchor="ctr"/>
+          <a:lstStyle/>
+          <a:p>
+            <a:pPr algn="ctr"/>
+            <a:r>
+              <a:rPr lang="en-US" sz="800" dirty="0">
+                <a:latin typeface="Arial" panose="020B0604020202020204" pitchFamily="34" charset="0"/>
+                <a:cs typeface="Arial" panose="020B0604020202020204" pitchFamily="34" charset="0"/>
+              </a:rPr>
+              <a:t>1.4</a:t>
+            </a:r>
+          </a:p>
+        </p:txBody>
+      </p:sp>
+      <p:sp>
+        <p:nvSpPr>
+          <p:cNvPr id="53" name="TextBox 52">
+            <a:extLst>
+              <a:ext uri="{FF2B5EF4-FFF2-40B4-BE49-F238E27FC236}">
+                <a16:creationId xmlns:a16="http://schemas.microsoft.com/office/drawing/2014/main" id="{9176A24E-7CE9-CD39-6D45-2B7AC1DCB49A}"/>
+              </a:ext>
+            </a:extLst>
+          </p:cNvPr>
+          <p:cNvSpPr txBox="1"/>
+          <p:nvPr/>
+        </p:nvSpPr>
+        <p:spPr>
+          <a:xfrm>
+            <a:off x="3020000" y="5858598"/>
+            <a:ext cx="1428885" cy="276999"/>
+          </a:xfrm>
+          <a:prstGeom prst="rect">
+            <a:avLst/>
+          </a:prstGeom>
+          <a:noFill/>
+        </p:spPr>
+        <p:txBody>
+          <a:bodyPr wrap="square" rtlCol="0">
+            <a:spAutoFit/>
+          </a:bodyPr>
+          <a:lstStyle/>
+          <a:p>
+            <a:pPr algn="ctr"/>
+            <a:r>
+              <a:rPr lang="en-US" sz="1200" dirty="0" err="1">
+                <a:latin typeface="Arial" panose="020B0604020202020204" pitchFamily="34" charset="0"/>
+                <a:cs typeface="Arial" panose="020B0604020202020204" pitchFamily="34" charset="0"/>
+              </a:rPr>
+              <a:t>CodeBuild</a:t>
+            </a:r>
+            <a:r>
+              <a:rPr lang="en-US" sz="1200" dirty="0">
+                <a:latin typeface="Arial" panose="020B0604020202020204" pitchFamily="34" charset="0"/>
+                <a:cs typeface="Arial" panose="020B0604020202020204" pitchFamily="34" charset="0"/>
+              </a:rPr>
+              <a:t> Role</a:t>
+            </a:r>
+          </a:p>
+        </p:txBody>
+      </p:sp>
+      <p:pic>
+        <p:nvPicPr>
+          <p:cNvPr id="54" name="Graphic 53">
+            <a:extLst>
+              <a:ext uri="{FF2B5EF4-FFF2-40B4-BE49-F238E27FC236}">
+                <a16:creationId xmlns:a16="http://schemas.microsoft.com/office/drawing/2014/main" id="{34776372-1F43-9181-EC99-E668CB59B18B}"/>
+              </a:ext>
+            </a:extLst>
+          </p:cNvPr>
+          <p:cNvPicPr>
+            <a:picLocks noChangeAspect="1"/>
+          </p:cNvPicPr>
+          <p:nvPr/>
+        </p:nvPicPr>
+        <p:blipFill>
+          <a:blip r:embed="rId12">
+            <a:extLst>
+              <a:ext uri="{96DAC541-7B7A-43D3-8B79-37D633B846F1}">
+                <asvg:svgBlip xmlns:asvg="http://schemas.microsoft.com/office/drawing/2016/SVG/main" r:embed="rId13"/>
+              </a:ext>
+            </a:extLst>
+          </a:blip>
+          <a:stretch>
+            <a:fillRect/>
+          </a:stretch>
+        </p:blipFill>
+        <p:spPr>
+          <a:xfrm>
+            <a:off x="3354058" y="5087156"/>
+            <a:ext cx="760770" cy="760770"/>
+          </a:xfrm>
+          <a:prstGeom prst="rect">
+            <a:avLst/>
+          </a:prstGeom>
+        </p:spPr>
+      </p:pic>
+      <p:sp>
+        <p:nvSpPr>
+          <p:cNvPr id="55" name="Oval 54">
+            <a:extLst>
+              <a:ext uri="{FF2B5EF4-FFF2-40B4-BE49-F238E27FC236}">
+                <a16:creationId xmlns:a16="http://schemas.microsoft.com/office/drawing/2014/main" id="{AB279368-44A2-73E1-C616-E5149D5B2804}"/>
+              </a:ext>
+            </a:extLst>
+          </p:cNvPr>
+          <p:cNvSpPr/>
+          <p:nvPr/>
+        </p:nvSpPr>
+        <p:spPr>
+          <a:xfrm>
+            <a:off x="3175420" y="5076484"/>
+            <a:ext cx="356742" cy="291049"/>
+          </a:xfrm>
+          <a:prstGeom prst="ellipse">
+            <a:avLst/>
+          </a:prstGeom>
+          <a:solidFill>
+            <a:schemeClr val="tx1"/>
+          </a:solidFill>
+          <a:ln>
+            <a:solidFill>
+              <a:schemeClr val="tx1"/>
+            </a:solidFill>
+          </a:ln>
+        </p:spPr>
+        <p:style>
+          <a:lnRef idx="2">
+            <a:schemeClr val="accent1">
+              <a:shade val="50000"/>
+            </a:schemeClr>
+          </a:lnRef>
+          <a:fillRef idx="1">
+            <a:schemeClr val="accent1"/>
+          </a:fillRef>
+          <a:effectRef idx="0">
+            <a:schemeClr val="accent1"/>
+          </a:effectRef>
+          <a:fontRef idx="minor">
+            <a:schemeClr val="lt1"/>
+          </a:fontRef>
+        </p:style>
+        <p:txBody>
+          <a:bodyPr lIns="0" tIns="0" rIns="0" bIns="0" rtlCol="0" anchor="ctr"/>
+          <a:lstStyle/>
+          <a:p>
+            <a:pPr algn="ctr"/>
+            <a:r>
+              <a:rPr lang="en-US" sz="800" dirty="0">
+                <a:latin typeface="Arial" panose="020B0604020202020204" pitchFamily="34" charset="0"/>
+                <a:cs typeface="Arial" panose="020B0604020202020204" pitchFamily="34" charset="0"/>
+              </a:rPr>
+              <a:t>1.6</a:t>
+            </a:r>
+          </a:p>
+        </p:txBody>
+      </p:sp>
+      <p:pic>
+        <p:nvPicPr>
+          <p:cNvPr id="61" name="Graphic 60" descr="Stack resource icon for the AWS CloudFormation service.">
+            <a:extLst>
+              <a:ext uri="{FF2B5EF4-FFF2-40B4-BE49-F238E27FC236}">
+                <a16:creationId xmlns:a16="http://schemas.microsoft.com/office/drawing/2014/main" id="{2F060231-8714-7ECA-583D-DD3E7684B122}"/>
+              </a:ext>
+            </a:extLst>
+          </p:cNvPr>
+          <p:cNvPicPr>
+            <a:picLocks noChangeAspect="1"/>
+          </p:cNvPicPr>
+          <p:nvPr/>
+        </p:nvPicPr>
+        <p:blipFill>
+          <a:blip r:embed="rId16">
+            <a:extLst>
+              <a:ext uri="{96DAC541-7B7A-43D3-8B79-37D633B846F1}">
+                <asvg:svgBlip xmlns:asvg="http://schemas.microsoft.com/office/drawing/2016/SVG/main" r:embed="rId17"/>
+              </a:ext>
+            </a:extLst>
+          </a:blip>
+          <a:stretch>
+            <a:fillRect/>
+          </a:stretch>
+        </p:blipFill>
+        <p:spPr>
+          <a:xfrm>
+            <a:off x="1906238" y="3418482"/>
+            <a:ext cx="760769" cy="760769"/>
+          </a:xfrm>
+          <a:prstGeom prst="rect">
+            <a:avLst/>
+          </a:prstGeom>
+        </p:spPr>
+      </p:pic>
+      <p:sp>
+        <p:nvSpPr>
+          <p:cNvPr id="27" name="Oval 26">
+            <a:extLst>
+              <a:ext uri="{FF2B5EF4-FFF2-40B4-BE49-F238E27FC236}">
+                <a16:creationId xmlns:a16="http://schemas.microsoft.com/office/drawing/2014/main" id="{02AC2346-5D6E-6FCE-0FA8-17F3A2D1A08F}"/>
+              </a:ext>
+            </a:extLst>
+          </p:cNvPr>
+          <p:cNvSpPr/>
+          <p:nvPr/>
+        </p:nvSpPr>
+        <p:spPr>
+          <a:xfrm>
+            <a:off x="1749889" y="3265942"/>
+            <a:ext cx="356742" cy="291049"/>
+          </a:xfrm>
+          <a:prstGeom prst="ellipse">
+            <a:avLst/>
+          </a:prstGeom>
+          <a:solidFill>
+            <a:schemeClr val="tx1"/>
+          </a:solidFill>
+          <a:ln>
+            <a:solidFill>
+              <a:schemeClr val="tx1"/>
+            </a:solidFill>
+          </a:ln>
+        </p:spPr>
+        <p:style>
+          <a:lnRef idx="2">
+            <a:schemeClr val="accent1">
+              <a:shade val="50000"/>
+            </a:schemeClr>
+          </a:lnRef>
+          <a:fillRef idx="1">
+            <a:schemeClr val="accent1"/>
+          </a:fillRef>
+          <a:effectRef idx="0">
+            <a:schemeClr val="accent1"/>
+          </a:effectRef>
+          <a:fontRef idx="minor">
+            <a:schemeClr val="lt1"/>
+          </a:fontRef>
+        </p:style>
+        <p:txBody>
+          <a:bodyPr lIns="0" tIns="0" rIns="0" bIns="0" rtlCol="0" anchor="ctr"/>
+          <a:lstStyle/>
+          <a:p>
+            <a:pPr algn="ctr"/>
+            <a:r>
+              <a:rPr lang="en-US" sz="800" dirty="0">
+                <a:latin typeface="Arial" panose="020B0604020202020204" pitchFamily="34" charset="0"/>
+                <a:cs typeface="Arial" panose="020B0604020202020204" pitchFamily="34" charset="0"/>
+              </a:rPr>
+              <a:t>1.7</a:t>
+            </a:r>
+          </a:p>
+        </p:txBody>
+      </p:sp>
     </p:spTree>
     <p:extLst>
       <p:ext uri="{BB962C8B-B14F-4D97-AF65-F5344CB8AC3E}">
-        <p14:creationId xmlns:p14="http://schemas.microsoft.com/office/powerpoint/2010/main" val="680312038"/>
+        <p14:creationId xmlns:p14="http://schemas.microsoft.com/office/powerpoint/2010/main" val="1848008119"/>
       </p:ext>
     </p:extLst>
   </p:cSld>

</xml_diff>